<commit_message>
remove unused sysfs node
</commit_message>
<xml_diff>
--- a/doc/Guideline for tas2781 Linux driver based on BBB.pptx
+++ b/doc/Guideline for tas2781 Linux driver based on BBB.pptx
@@ -210,20 +210,6 @@
 </p:cmAuthorLst>
 </file>
 
-<file path=ppt/comments/comment1.xml><?xml version="1.0" encoding="utf-8"?>
-<p:cmLst xmlns:a="http://schemas.openxmlformats.org/drawingml/2006/main" xmlns:r="http://schemas.openxmlformats.org/officeDocument/2006/relationships" xmlns:p="http://schemas.openxmlformats.org/presentationml/2006/main">
-  <p:cm authorId="2" dt="2022-10-10T11:08:10.164" idx="3">
-    <p:pos x="1458" y="2373"/>
-    <p:text>Insert makefile</p:text>
-    <p:extLst>
-      <p:ext uri="{C676402C-5697-4E1C-873F-D02D1690AC5C}">
-        <p15:threadingInfo xmlns:p15="http://schemas.microsoft.com/office/powerpoint/2012/main" timeZoneBias="-480"/>
-      </p:ext>
-    </p:extLst>
-  </p:cm>
-</p:cmLst>
-</file>
-
 <file path=ppt/notesMasters/notesMaster1.xml><?xml version="1.0" encoding="utf-8"?>
 <p:notesMaster xmlns:a="http://schemas.openxmlformats.org/drawingml/2006/main" xmlns:r="http://schemas.openxmlformats.org/officeDocument/2006/relationships" xmlns:p="http://schemas.openxmlformats.org/presentationml/2006/main">
   <p:cSld>
@@ -306,7 +292,7 @@
           <a:p>
             <a:fld id="{1F697FBE-C442-4BD6-B1C1-3CD7A2814162}" type="datetimeFigureOut">
               <a:rPr lang="zh-CN" altLang="en-US" smtClean="0"/>
-              <a:t>2022/10/11</a:t>
+              <a:t>2022/10/12</a:t>
             </a:fld>
             <a:endParaRPr lang="zh-CN" altLang="en-US"/>
           </a:p>
@@ -12489,12 +12475,8 @@
               <a:t> </a:t>
             </a:r>
             <a:r>
-              <a:rPr lang="en-US" altLang="zh-CN" sz="3600" dirty="0" err="1"/>
-              <a:t>fwload</a:t>
-            </a:r>
-            <a:r>
               <a:rPr lang="en-US" altLang="zh-CN" sz="3600" dirty="0"/>
-              <a:t>/i2caddr</a:t>
+              <a:t>i2caddr</a:t>
             </a:r>
             <a:r>
               <a:rPr lang="en-US" altLang="zh-CN" dirty="0"/>
@@ -12510,10 +12492,10 @@
       </p:sp>
       <p:sp>
         <p:nvSpPr>
-          <p:cNvPr id="7" name="内容占位符 6">
+          <p:cNvPr id="11" name="Content Placeholder 10">
             <a:extLst>
               <a:ext uri="{FF2B5EF4-FFF2-40B4-BE49-F238E27FC236}">
-                <a16:creationId xmlns:a16="http://schemas.microsoft.com/office/drawing/2014/main" id="{88EE38F9-0269-4DD7-B0FE-B771F2A3C2A9}"/>
+                <a16:creationId xmlns:a16="http://schemas.microsoft.com/office/drawing/2014/main" id="{1665BE40-D67D-476F-BDEE-FEC4215908B4}"/>
               </a:ext>
             </a:extLst>
           </p:cNvPr>
@@ -12524,67 +12506,42 @@
             <p:ph sz="half" idx="1"/>
           </p:nvPr>
         </p:nvSpPr>
-        <p:spPr>
-          <a:xfrm>
-            <a:off x="444514" y="1185866"/>
-            <a:ext cx="5543551" cy="1887290"/>
-          </a:xfrm>
-        </p:spPr>
+        <p:spPr/>
         <p:txBody>
           <a:bodyPr/>
           <a:lstStyle/>
           <a:p>
             <a:r>
               <a:rPr lang="en-US" altLang="zh-CN" sz="2400" dirty="0"/>
-              <a:t>#echo &gt; </a:t>
+              <a:t>#</a:t>
             </a:r>
             <a:r>
               <a:rPr lang="en-US" altLang="zh-CN" sz="2400" dirty="0" err="1"/>
-              <a:t>fwload</a:t>
-            </a:r>
-            <a:endParaRPr lang="en-US" altLang="zh-CN" sz="2400" dirty="0"/>
+              <a:t>amixer</a:t>
+            </a:r>
+            <a:r>
+              <a:rPr lang="en-US" altLang="zh-CN" sz="2400" dirty="0"/>
+              <a:t> contents</a:t>
+            </a:r>
+            <a:endParaRPr lang="en-US" altLang="zh-CN" sz="1800" dirty="0"/>
           </a:p>
           <a:p>
             <a:pPr marL="454846" lvl="1" indent="0">
-              <a:buNone/>
-            </a:pPr>
-            <a:r>
-              <a:rPr lang="en-US" altLang="zh-CN" dirty="0" err="1"/>
-              <a:t>lllustration</a:t>
-            </a:r>
-            <a:r>
-              <a:rPr lang="en-US" altLang="zh-CN" dirty="0"/>
-              <a:t>: Use for debug if firmware has not been compiled into </a:t>
-            </a:r>
-            <a:r>
-              <a:rPr lang="en-US" altLang="zh-CN" dirty="0" err="1"/>
-              <a:t>rootfs</a:t>
-            </a:r>
-            <a:r>
-              <a:rPr lang="en-US" altLang="zh-CN" dirty="0"/>
-              <a:t>.</a:t>
-            </a:r>
-          </a:p>
-          <a:p>
-            <a:pPr marL="454846" lvl="1" indent="0">
+              <a:buFontTx/>
               <a:buNone/>
             </a:pPr>
             <a:endParaRPr lang="en-US" altLang="zh-CN" sz="1800" dirty="0"/>
           </a:p>
           <a:p>
             <a:pPr marL="454846" lvl="1" indent="0">
+              <a:buFontTx/>
               <a:buNone/>
             </a:pPr>
             <a:endParaRPr lang="en-US" altLang="zh-CN" sz="1800" dirty="0"/>
           </a:p>
           <a:p>
             <a:pPr marL="454846" lvl="1" indent="0">
-              <a:buNone/>
-            </a:pPr>
-            <a:endParaRPr lang="en-US" altLang="zh-CN" sz="1800" dirty="0"/>
-          </a:p>
-          <a:p>
-            <a:pPr marL="454846" lvl="1" indent="0">
+              <a:buFontTx/>
               <a:buNone/>
             </a:pPr>
             <a:endParaRPr lang="en-US" altLang="zh-CN" sz="1800" dirty="0"/>
@@ -12595,6 +12552,9 @@
               <a:buAutoNum type="arabicPeriod" startAt="2"/>
             </a:pPr>
             <a:endParaRPr lang="en-US" altLang="zh-CN" sz="1800" dirty="0"/>
+          </a:p>
+          <a:p>
+            <a:endParaRPr lang="en-US" dirty="0"/>
           </a:p>
         </p:txBody>
       </p:sp>
@@ -12727,10 +12687,10 @@
       </p:sp>
       <p:pic>
         <p:nvPicPr>
-          <p:cNvPr id="9" name="图片 8">
+          <p:cNvPr id="3" name="图片 2">
             <a:extLst>
               <a:ext uri="{FF2B5EF4-FFF2-40B4-BE49-F238E27FC236}">
-                <a16:creationId xmlns:a16="http://schemas.microsoft.com/office/drawing/2014/main" id="{C7ACA08B-F145-4A3C-A316-44DA285AC182}"/>
+                <a16:creationId xmlns:a16="http://schemas.microsoft.com/office/drawing/2014/main" id="{A27898F0-27DF-706F-983C-F5C6339BD746}"/>
               </a:ext>
             </a:extLst>
           </p:cNvPr>
@@ -12747,37 +12707,7 @@
         </p:blipFill>
         <p:spPr>
           <a:xfrm>
-            <a:off x="550944" y="2291616"/>
-            <a:ext cx="5405809" cy="664286"/>
-          </a:xfrm>
-          <a:prstGeom prst="rect">
-            <a:avLst/>
-          </a:prstGeom>
-        </p:spPr>
-      </p:pic>
-      <p:pic>
-        <p:nvPicPr>
-          <p:cNvPr id="3" name="图片 2">
-            <a:extLst>
-              <a:ext uri="{FF2B5EF4-FFF2-40B4-BE49-F238E27FC236}">
-                <a16:creationId xmlns:a16="http://schemas.microsoft.com/office/drawing/2014/main" id="{A27898F0-27DF-706F-983C-F5C6339BD746}"/>
-              </a:ext>
-            </a:extLst>
-          </p:cNvPr>
-          <p:cNvPicPr>
-            <a:picLocks noChangeAspect="1"/>
-          </p:cNvPicPr>
-          <p:nvPr/>
-        </p:nvPicPr>
-        <p:blipFill>
-          <a:blip r:embed="rId3"/>
-          <a:stretch>
-            <a:fillRect/>
-          </a:stretch>
-        </p:blipFill>
-        <p:spPr>
-          <a:xfrm>
-            <a:off x="309033" y="3784845"/>
+            <a:off x="457199" y="1597428"/>
             <a:ext cx="5942001" cy="1605329"/>
           </a:xfrm>
           <a:prstGeom prst="rect">
@@ -12800,7 +12730,7 @@
           <p:nvPr/>
         </p:nvPicPr>
         <p:blipFill>
-          <a:blip r:embed="rId4"/>
+          <a:blip r:embed="rId3"/>
           <a:stretch>
             <a:fillRect/>
           </a:stretch>
@@ -12830,7 +12760,7 @@
           <p:nvPr/>
         </p:nvPicPr>
         <p:blipFill>
-          <a:blip r:embed="rId5"/>
+          <a:blip r:embed="rId4"/>
           <a:stretch>
             <a:fillRect/>
           </a:stretch>
@@ -12845,226 +12775,6 @@
           </a:prstGeom>
         </p:spPr>
       </p:pic>
-      <p:sp>
-        <p:nvSpPr>
-          <p:cNvPr id="4" name="内容占位符 6">
-            <a:extLst>
-              <a:ext uri="{FF2B5EF4-FFF2-40B4-BE49-F238E27FC236}">
-                <a16:creationId xmlns:a16="http://schemas.microsoft.com/office/drawing/2014/main" id="{9A64524D-CAB6-55FC-2997-48FF1C567F80}"/>
-              </a:ext>
-            </a:extLst>
-          </p:cNvPr>
-          <p:cNvSpPr txBox="1">
-            <a:spLocks/>
-          </p:cNvSpPr>
-          <p:nvPr/>
-        </p:nvSpPr>
-        <p:spPr bwMode="auto">
-          <a:xfrm>
-            <a:off x="404282" y="3268424"/>
-            <a:ext cx="5543551" cy="793228"/>
-          </a:xfrm>
-          <a:prstGeom prst="rect">
-            <a:avLst/>
-          </a:prstGeom>
-          <a:noFill/>
-          <a:ln w="9525" algn="ctr">
-            <a:noFill/>
-            <a:miter lim="800000"/>
-            <a:headEnd/>
-            <a:tailEnd/>
-          </a:ln>
-        </p:spPr>
-        <p:txBody>
-          <a:bodyPr vert="horz" wrap="square" lIns="76163" tIns="38086" rIns="76163" bIns="38086" numCol="1" anchor="t" anchorCtr="0" compatLnSpc="1">
-            <a:prstTxWarp prst="textNoShape">
-              <a:avLst/>
-            </a:prstTxWarp>
-          </a:bodyPr>
-          <a:lstStyle>
-            <a:lvl1pPr marL="252034" indent="-252034" algn="l" rtl="0" eaLnBrk="0" fontAlgn="base" hangingPunct="0">
-              <a:spcBef>
-                <a:spcPts val="889"/>
-              </a:spcBef>
-              <a:spcAft>
-                <a:spcPct val="0"/>
-              </a:spcAft>
-              <a:buChar char="•"/>
-              <a:defRPr lang="en-US" sz="2300" smtClean="0">
-                <a:solidFill>
-                  <a:schemeClr val="tx1"/>
-                </a:solidFill>
-                <a:latin typeface="+mn-lt"/>
-                <a:ea typeface="+mn-ea"/>
-                <a:cs typeface="+mn-cs"/>
-              </a:defRPr>
-            </a:lvl1pPr>
-            <a:lvl2pPr marL="638011" indent="-259088" algn="l" rtl="0" eaLnBrk="0" fontAlgn="base" hangingPunct="0">
-              <a:spcBef>
-                <a:spcPct val="20000"/>
-              </a:spcBef>
-              <a:spcAft>
-                <a:spcPct val="0"/>
-              </a:spcAft>
-              <a:buChar char="–"/>
-              <a:defRPr lang="en-US" sz="2000" smtClean="0">
-                <a:solidFill>
-                  <a:schemeClr val="tx1"/>
-                </a:solidFill>
-                <a:latin typeface="+mn-lt"/>
-                <a:ea typeface="+mn-ea"/>
-                <a:cs typeface="+mn-cs"/>
-              </a:defRPr>
-            </a:lvl2pPr>
-            <a:lvl3pPr marL="948199" indent="-183309" algn="l" rtl="0" eaLnBrk="0" fontAlgn="base" hangingPunct="0">
-              <a:spcBef>
-                <a:spcPct val="15000"/>
-              </a:spcBef>
-              <a:spcAft>
-                <a:spcPct val="0"/>
-              </a:spcAft>
-              <a:buChar char="•"/>
-              <a:defRPr lang="en-US" sz="2000" smtClean="0">
-                <a:solidFill>
-                  <a:schemeClr val="tx1"/>
-                </a:solidFill>
-                <a:latin typeface="+mn-lt"/>
-                <a:ea typeface="+mn-ea"/>
-                <a:cs typeface="+mn-cs"/>
-              </a:defRPr>
-            </a:lvl3pPr>
-            <a:lvl4pPr marL="1334177" indent="-259088" algn="l" rtl="0" eaLnBrk="0" fontAlgn="base" hangingPunct="0">
-              <a:spcBef>
-                <a:spcPct val="5000"/>
-              </a:spcBef>
-              <a:spcAft>
-                <a:spcPct val="0"/>
-              </a:spcAft>
-              <a:buChar char="–"/>
-              <a:defRPr lang="en-US" sz="2000" smtClean="0">
-                <a:solidFill>
-                  <a:schemeClr val="tx1"/>
-                </a:solidFill>
-                <a:latin typeface="+mn-lt"/>
-                <a:ea typeface="+mn-ea"/>
-                <a:cs typeface="+mn-cs"/>
-              </a:defRPr>
-            </a:lvl4pPr>
-            <a:lvl5pPr marL="1653172" indent="-192129" algn="l" rtl="0" eaLnBrk="0" fontAlgn="base" hangingPunct="0">
-              <a:spcBef>
-                <a:spcPct val="0"/>
-              </a:spcBef>
-              <a:spcAft>
-                <a:spcPct val="0"/>
-              </a:spcAft>
-              <a:buChar char="»"/>
-              <a:defRPr lang="en-US" sz="2300">
-                <a:solidFill>
-                  <a:schemeClr val="tx1"/>
-                </a:solidFill>
-                <a:latin typeface="+mn-lt"/>
-                <a:ea typeface="+mn-ea"/>
-                <a:cs typeface="+mn-cs"/>
-              </a:defRPr>
-            </a:lvl5pPr>
-            <a:lvl6pPr marL="2160763" indent="-192129" algn="l" rtl="0" fontAlgn="base">
-              <a:spcBef>
-                <a:spcPct val="0"/>
-              </a:spcBef>
-              <a:spcAft>
-                <a:spcPct val="0"/>
-              </a:spcAft>
-              <a:buChar char="»"/>
-              <a:defRPr sz="2000">
-                <a:solidFill>
-                  <a:schemeClr val="tx1"/>
-                </a:solidFill>
-                <a:latin typeface="+mn-lt"/>
-              </a:defRPr>
-            </a:lvl6pPr>
-            <a:lvl7pPr marL="2668355" indent="-192129" algn="l" rtl="0" fontAlgn="base">
-              <a:spcBef>
-                <a:spcPct val="0"/>
-              </a:spcBef>
-              <a:spcAft>
-                <a:spcPct val="0"/>
-              </a:spcAft>
-              <a:buChar char="»"/>
-              <a:defRPr sz="2000">
-                <a:solidFill>
-                  <a:schemeClr val="tx1"/>
-                </a:solidFill>
-                <a:latin typeface="+mn-lt"/>
-              </a:defRPr>
-            </a:lvl7pPr>
-            <a:lvl8pPr marL="3175943" indent="-192129" algn="l" rtl="0" fontAlgn="base">
-              <a:spcBef>
-                <a:spcPct val="0"/>
-              </a:spcBef>
-              <a:spcAft>
-                <a:spcPct val="0"/>
-              </a:spcAft>
-              <a:buChar char="»"/>
-              <a:defRPr sz="2000">
-                <a:solidFill>
-                  <a:schemeClr val="tx1"/>
-                </a:solidFill>
-                <a:latin typeface="+mn-lt"/>
-              </a:defRPr>
-            </a:lvl8pPr>
-            <a:lvl9pPr marL="3683535" indent="-192129" algn="l" rtl="0" fontAlgn="base">
-              <a:spcBef>
-                <a:spcPct val="0"/>
-              </a:spcBef>
-              <a:spcAft>
-                <a:spcPct val="0"/>
-              </a:spcAft>
-              <a:buChar char="»"/>
-              <a:defRPr sz="2000">
-                <a:solidFill>
-                  <a:schemeClr val="tx1"/>
-                </a:solidFill>
-                <a:latin typeface="+mn-lt"/>
-              </a:defRPr>
-            </a:lvl9pPr>
-          </a:lstStyle>
-          <a:p>
-            <a:r>
-              <a:rPr lang="en-US" altLang="zh-CN" sz="2400" kern="0" dirty="0"/>
-              <a:t>#amixer contents</a:t>
-            </a:r>
-            <a:endParaRPr lang="en-US" altLang="zh-CN" sz="1800" kern="0" dirty="0"/>
-          </a:p>
-          <a:p>
-            <a:pPr marL="454846" lvl="1" indent="0">
-              <a:buFontTx/>
-              <a:buNone/>
-            </a:pPr>
-            <a:endParaRPr lang="en-US" altLang="zh-CN" sz="1800" kern="0" dirty="0"/>
-          </a:p>
-          <a:p>
-            <a:pPr marL="454846" lvl="1" indent="0">
-              <a:buFontTx/>
-              <a:buNone/>
-            </a:pPr>
-            <a:endParaRPr lang="en-US" altLang="zh-CN" sz="1800" kern="0" dirty="0"/>
-          </a:p>
-          <a:p>
-            <a:pPr marL="454846" lvl="1" indent="0">
-              <a:buFontTx/>
-              <a:buNone/>
-            </a:pPr>
-            <a:endParaRPr lang="en-US" altLang="zh-CN" sz="1800" kern="0" dirty="0"/>
-          </a:p>
-          <a:p>
-            <a:pPr marL="797746" lvl="1" indent="-342900">
-              <a:buFont typeface="+mj-lt"/>
-              <a:buAutoNum type="arabicPeriod" startAt="2"/>
-            </a:pPr>
-            <a:endParaRPr lang="en-US" altLang="zh-CN" sz="1800" kern="0" dirty="0"/>
-          </a:p>
-        </p:txBody>
-      </p:sp>
     </p:spTree>
     <p:extLst>
       <p:ext uri="{BB962C8B-B14F-4D97-AF65-F5344CB8AC3E}">
@@ -13645,7 +13355,7 @@
                 <a:buFontTx/>
                 <a:buNone/>
               </a:pPr>
-              <a:t>10/11/2022</a:t>
+              <a:t>10/12/2022</a:t>
             </a:fld>
             <a:endParaRPr lang="en-US" altLang="zh-CN" sz="1000">
               <a:ea typeface="宋体" panose="02010600030101010101" pitchFamily="2" charset="-122"/>
@@ -22523,12 +22233,12 @@
           <a:graphicData uri="http://schemas.openxmlformats.org/presentationml/2006/ole">
             <mc:AlternateContent xmlns:mc="http://schemas.openxmlformats.org/markup-compatibility/2006">
               <mc:Choice xmlns:v="urn:schemas-microsoft-com:vml" Requires="v">
-                <p:oleObj name="包装程序外壳对象" showAsIcon="1" r:id="rId2" imgW="731520" imgH="663058" progId="Package">
+                <p:oleObj spid="_x0000_s3076" name="包装程序外壳对象" showAsIcon="1" r:id="rId3" imgW="731520" imgH="663058" progId="Package">
                   <p:embed/>
                 </p:oleObj>
               </mc:Choice>
               <mc:Fallback>
-                <p:oleObj name="包装程序外壳对象" showAsIcon="1" r:id="rId2" imgW="731520" imgH="663058" progId="Package">
+                <p:oleObj name="包装程序外壳对象" showAsIcon="1" r:id="rId3" imgW="731520" imgH="663058" progId="Package">
                   <p:embed/>
                   <p:pic>
                     <p:nvPicPr>
@@ -22543,7 +22253,7 @@
                       <p:nvPr/>
                     </p:nvPicPr>
                     <p:blipFill>
-                      <a:blip r:embed="rId3"/>
+                      <a:blip r:embed="rId4"/>
                       <a:stretch>
                         <a:fillRect/>
                       </a:stretch>
@@ -22592,12 +22302,12 @@
           <a:graphicData uri="http://schemas.openxmlformats.org/presentationml/2006/ole">
             <mc:AlternateContent xmlns:mc="http://schemas.openxmlformats.org/markup-compatibility/2006">
               <mc:Choice xmlns:v="urn:schemas-microsoft-com:vml" Requires="v">
-                <p:oleObj name="包装程序外壳对象" showAsIcon="1" r:id="rId4" imgW="619200" imgH="559800" progId="Package">
+                <p:oleObj spid="_x0000_s3077" name="包装程序外壳对象" showAsIcon="1" r:id="rId5" imgW="619200" imgH="559800" progId="Package">
                   <p:embed/>
                 </p:oleObj>
               </mc:Choice>
               <mc:Fallback>
-                <p:oleObj name="包装程序外壳对象" showAsIcon="1" r:id="rId4" imgW="619200" imgH="559800" progId="Package">
+                <p:oleObj name="包装程序外壳对象" showAsIcon="1" r:id="rId5" imgW="619200" imgH="559800" progId="Package">
                   <p:embed/>
                   <p:pic>
                     <p:nvPicPr>
@@ -22612,7 +22322,7 @@
                       <p:nvPr/>
                     </p:nvPicPr>
                     <p:blipFill>
-                      <a:blip r:embed="rId5"/>
+                      <a:blip r:embed="rId6"/>
                       <a:stretch>
                         <a:fillRect/>
                       </a:stretch>
@@ -27704,7 +27414,7 @@
               <a:rPr lang="en-US" altLang="zh-CN" sz="1800" dirty="0">
                 <a:latin typeface="Segoe UI" panose="020B0502040204020203" pitchFamily="34" charset="0"/>
               </a:rPr>
-              <a:t>Move</a:t>
+              <a:t>copy</a:t>
             </a:r>
             <a:r>
               <a:rPr lang="en-US" altLang="zh-CN" sz="1800" b="0" i="0" dirty="0">
@@ -29474,7 +29184,7 @@
               <a:buSzPct val="75000"/>
               <a:buFont typeface="Arial" panose="020B0604020202020204" pitchFamily="34" charset="0"/>
               <a:buBlip>
-                <a:blip r:embed="rId3"/>
+                <a:blip r:embed="rId4"/>
               </a:buBlip>
               <a:defRPr sz="2000">
                 <a:solidFill>
@@ -29666,7 +29376,7 @@
                 <a:buFontTx/>
                 <a:buNone/>
               </a:pPr>
-              <a:t>10/11/2022</a:t>
+              <a:t>10/12/2022</a:t>
             </a:fld>
             <a:endParaRPr lang="en-US" altLang="zh-CN" sz="1000">
               <a:ea typeface="宋体" panose="02010600030101010101" pitchFamily="2" charset="-122"/>
@@ -29951,7 +29661,7 @@
           <p:nvPr/>
         </p:nvPicPr>
         <p:blipFill>
-          <a:blip r:embed="rId4">
+          <a:blip r:embed="rId5">
             <a:extLst>
               <a:ext uri="{28A0092B-C50C-407E-A947-70E740481C1C}">
                 <a14:useLocalDpi xmlns:a14="http://schemas.microsoft.com/office/drawing/2010/main" val="0"/>
@@ -30208,7 +29918,7 @@
           <p:nvPr/>
         </p:nvPicPr>
         <p:blipFill>
-          <a:blip r:embed="rId5"/>
+          <a:blip r:embed="rId6"/>
           <a:stretch>
             <a:fillRect/>
           </a:stretch>
@@ -30238,7 +29948,7 @@
           <p:nvPr/>
         </p:nvPicPr>
         <p:blipFill>
-          <a:blip r:embed="rId6"/>
+          <a:blip r:embed="rId7"/>
           <a:stretch>
             <a:fillRect/>
           </a:stretch>
@@ -30453,7 +30163,7 @@
       <p:graphicFrame>
         <p:nvGraphicFramePr>
           <p:cNvPr id="9" name="对象 8">
-            <a:hlinkClick r:id="rId7" action="ppaction://hlinkfile"/>
+            <a:hlinkClick r:id="rId8" action="ppaction://hlinkfile"/>
             <a:extLst>
               <a:ext uri="{FF2B5EF4-FFF2-40B4-BE49-F238E27FC236}">
                 <a16:creationId xmlns:a16="http://schemas.microsoft.com/office/drawing/2014/main" id="{CBB4F72A-79D8-AC5E-61CD-EEED233216FB}"/>
@@ -30479,12 +30189,12 @@
           <a:graphicData uri="http://schemas.openxmlformats.org/presentationml/2006/ole">
             <mc:AlternateContent xmlns:mc="http://schemas.openxmlformats.org/markup-compatibility/2006">
               <mc:Choice xmlns:v="urn:schemas-microsoft-com:vml" Requires="v">
-                <p:oleObj name="包装程序外壳对象" showAsIcon="1" r:id="rId8" imgW="2094840" imgH="552600" progId="Package">
+                <p:oleObj spid="_x0000_s1027" name="包装程序外壳对象" showAsIcon="1" r:id="rId9" imgW="2094840" imgH="552600" progId="Package">
                   <p:embed/>
                 </p:oleObj>
               </mc:Choice>
               <mc:Fallback>
-                <p:oleObj name="包装程序外壳对象" showAsIcon="1" r:id="rId8" imgW="2094840" imgH="552600" progId="Package">
+                <p:oleObj name="包装程序外壳对象" showAsIcon="1" r:id="rId9" imgW="2094840" imgH="552600" progId="Package">
                   <p:embed/>
                   <p:pic>
                     <p:nvPicPr>
@@ -30500,7 +30210,7 @@
                       <p:nvPr/>
                     </p:nvPicPr>
                     <p:blipFill>
-                      <a:blip r:embed="rId9"/>
+                      <a:blip r:embed="rId10"/>
                       <a:stretch>
                         <a:fillRect/>
                       </a:stretch>
@@ -30639,7 +30349,7 @@
               <a:buSzPct val="75000"/>
               <a:buFont typeface="Arial" panose="020B0604020202020204" pitchFamily="34" charset="0"/>
               <a:buBlip>
-                <a:blip r:embed="rId2"/>
+                <a:blip r:embed="rId3"/>
               </a:buBlip>
               <a:defRPr sz="2000">
                 <a:solidFill>
@@ -30831,7 +30541,7 @@
                 <a:buFontTx/>
                 <a:buNone/>
               </a:pPr>
-              <a:t>10/11/2022</a:t>
+              <a:t>10/12/2022</a:t>
             </a:fld>
             <a:endParaRPr lang="en-US" altLang="zh-CN" sz="1000">
               <a:ea typeface="宋体" panose="02010600030101010101" pitchFamily="2" charset="-122"/>
@@ -31116,7 +30826,7 @@
           <p:nvPr/>
         </p:nvPicPr>
         <p:blipFill>
-          <a:blip r:embed="rId3"/>
+          <a:blip r:embed="rId4"/>
           <a:stretch>
             <a:fillRect/>
           </a:stretch>
@@ -31146,7 +30856,7 @@
           <p:nvPr/>
         </p:nvPicPr>
         <p:blipFill>
-          <a:blip r:embed="rId4">
+          <a:blip r:embed="rId5">
             <a:extLst>
               <a:ext uri="{28A0092B-C50C-407E-A947-70E740481C1C}">
                 <a14:useLocalDpi xmlns:a14="http://schemas.microsoft.com/office/drawing/2010/main" val="0"/>
@@ -31411,7 +31121,7 @@
           <p:nvPr/>
         </p:nvPicPr>
         <p:blipFill>
-          <a:blip r:embed="rId5"/>
+          <a:blip r:embed="rId6"/>
           <a:stretch>
             <a:fillRect/>
           </a:stretch>
@@ -31626,7 +31336,7 @@
       <p:graphicFrame>
         <p:nvGraphicFramePr>
           <p:cNvPr id="8" name="对象 7">
-            <a:hlinkClick r:id="rId6" action="ppaction://hlinkfile"/>
+            <a:hlinkClick r:id="rId7" action="ppaction://hlinkfile"/>
             <a:extLst>
               <a:ext uri="{FF2B5EF4-FFF2-40B4-BE49-F238E27FC236}">
                 <a16:creationId xmlns:a16="http://schemas.microsoft.com/office/drawing/2014/main" id="{F8ED35B6-85E0-3A75-FCD7-5424FDC3BC2C}"/>
@@ -31652,12 +31362,12 @@
           <a:graphicData uri="http://schemas.openxmlformats.org/presentationml/2006/ole">
             <mc:AlternateContent xmlns:mc="http://schemas.openxmlformats.org/markup-compatibility/2006">
               <mc:Choice xmlns:v="urn:schemas-microsoft-com:vml" Requires="v">
-                <p:oleObj name="包装程序外壳对象" showAsIcon="1" r:id="rId7" imgW="2094840" imgH="552600" progId="Package">
+                <p:oleObj spid="_x0000_s2051" name="包装程序外壳对象" showAsIcon="1" r:id="rId8" imgW="2094840" imgH="552600" progId="Package">
                   <p:embed/>
                 </p:oleObj>
               </mc:Choice>
               <mc:Fallback>
-                <p:oleObj name="包装程序外壳对象" showAsIcon="1" r:id="rId7" imgW="2094840" imgH="552600" progId="Package">
+                <p:oleObj name="包装程序外壳对象" showAsIcon="1" r:id="rId8" imgW="2094840" imgH="552600" progId="Package">
                   <p:embed/>
                   <p:pic>
                     <p:nvPicPr>
@@ -31673,7 +31383,7 @@
                       <p:nvPr/>
                     </p:nvPicPr>
                     <p:blipFill>
-                      <a:blip r:embed="rId8"/>
+                      <a:blip r:embed="rId9"/>
                       <a:stretch>
                         <a:fillRect/>
                       </a:stretch>

</xml_diff>

<commit_message>
Modify Guideline to add description of kcontrol setting
</commit_message>
<xml_diff>
--- a/doc/Guideline for tas2781 Linux driver based on BBB.pptx
+++ b/doc/Guideline for tas2781 Linux driver based on BBB.pptx
@@ -6,7 +6,7 @@
     <p:sldMasterId id="2147483668" r:id="rId2"/>
   </p:sldMasterIdLst>
   <p:notesMasterIdLst>
-    <p:notesMasterId r:id="rId35"/>
+    <p:notesMasterId r:id="rId36"/>
   </p:notesMasterIdLst>
   <p:sldIdLst>
     <p:sldId id="256" r:id="rId3"/>
@@ -25,22 +25,23 @@
     <p:sldId id="968" r:id="rId16"/>
     <p:sldId id="964" r:id="rId17"/>
     <p:sldId id="759" r:id="rId18"/>
-    <p:sldId id="948" r:id="rId19"/>
-    <p:sldId id="954" r:id="rId20"/>
-    <p:sldId id="955" r:id="rId21"/>
-    <p:sldId id="950" r:id="rId22"/>
-    <p:sldId id="951" r:id="rId23"/>
-    <p:sldId id="952" r:id="rId24"/>
-    <p:sldId id="956" r:id="rId25"/>
-    <p:sldId id="957" r:id="rId26"/>
-    <p:sldId id="970" r:id="rId27"/>
-    <p:sldId id="757" r:id="rId28"/>
-    <p:sldId id="756" r:id="rId29"/>
-    <p:sldId id="375" r:id="rId30"/>
-    <p:sldId id="969" r:id="rId31"/>
-    <p:sldId id="758" r:id="rId32"/>
-    <p:sldId id="958" r:id="rId33"/>
-    <p:sldId id="301" r:id="rId34"/>
+    <p:sldId id="972" r:id="rId19"/>
+    <p:sldId id="948" r:id="rId20"/>
+    <p:sldId id="954" r:id="rId21"/>
+    <p:sldId id="955" r:id="rId22"/>
+    <p:sldId id="950" r:id="rId23"/>
+    <p:sldId id="951" r:id="rId24"/>
+    <p:sldId id="952" r:id="rId25"/>
+    <p:sldId id="956" r:id="rId26"/>
+    <p:sldId id="957" r:id="rId27"/>
+    <p:sldId id="970" r:id="rId28"/>
+    <p:sldId id="757" r:id="rId29"/>
+    <p:sldId id="756" r:id="rId30"/>
+    <p:sldId id="375" r:id="rId31"/>
+    <p:sldId id="969" r:id="rId32"/>
+    <p:sldId id="758" r:id="rId33"/>
+    <p:sldId id="958" r:id="rId34"/>
+    <p:sldId id="301" r:id="rId35"/>
   </p:sldIdLst>
   <p:sldSz cx="12192000" cy="6858000"/>
   <p:notesSz cx="6858000" cy="9144000"/>
@@ -160,6 +161,7 @@
             <p14:sldId id="968"/>
             <p14:sldId id="964"/>
             <p14:sldId id="759"/>
+            <p14:sldId id="972"/>
             <p14:sldId id="948"/>
             <p14:sldId id="954"/>
             <p14:sldId id="955"/>
@@ -292,7 +294,7 @@
           <a:p>
             <a:fld id="{1F697FBE-C442-4BD6-B1C1-3CD7A2814162}" type="datetimeFigureOut">
               <a:rPr lang="zh-CN" altLang="en-US" smtClean="0"/>
-              <a:t>2022/10/12</a:t>
+              <a:t>2022/10/14</a:t>
             </a:fld>
             <a:endParaRPr lang="zh-CN" altLang="en-US"/>
           </a:p>
@@ -12103,10 +12105,10 @@
       </p:grpSpPr>
       <p:sp>
         <p:nvSpPr>
-          <p:cNvPr id="6" name="标题 5">
+          <p:cNvPr id="2" name="Title 1">
             <a:extLst>
               <a:ext uri="{FF2B5EF4-FFF2-40B4-BE49-F238E27FC236}">
-                <a16:creationId xmlns:a16="http://schemas.microsoft.com/office/drawing/2014/main" id="{D6F6AC84-A378-485C-A3D5-469F0AB06CF2}"/>
+                <a16:creationId xmlns:a16="http://schemas.microsoft.com/office/drawing/2014/main" id="{9F51B46A-FA67-4ADA-A898-2017030BD08F}"/>
               </a:ext>
             </a:extLst>
           </p:cNvPr>
@@ -12123,60 +12125,27 @@
           <a:lstStyle/>
           <a:p>
             <a:r>
-              <a:rPr lang="en-US" altLang="zh-CN" sz="3600" b="1" strike="noStrike" spc="-1" dirty="0">
-                <a:solidFill>
-                  <a:srgbClr val="DE0000"/>
-                </a:solidFill>
-                <a:uFill>
-                  <a:solidFill>
-                    <a:srgbClr val="FFFFFF"/>
-                  </a:solidFill>
-                </a:uFill>
-                <a:latin typeface="Arial" panose="020B0604020202020204"/>
-                <a:ea typeface="DejaVu Sans"/>
+              <a:rPr lang="en-US" altLang="zh-CN" dirty="0">
+                <a:ea typeface="宋体" panose="02010600030101010101" pitchFamily="2" charset="-122"/>
               </a:rPr>
-              <a:t>Driver nodes I </a:t>
-            </a:r>
-            <a:r>
-              <a:rPr lang="en-US" altLang="zh-CN" spc="-1" dirty="0">
-                <a:solidFill>
-                  <a:srgbClr val="DE0000"/>
-                </a:solidFill>
-                <a:uFill>
-                  <a:solidFill>
-                    <a:srgbClr val="FFFFFF"/>
-                  </a:solidFill>
-                </a:uFill>
-                <a:latin typeface="Arial" panose="020B0604020202020204"/>
-                <a:ea typeface="DejaVu Sans"/>
+              <a:t>Audio card | </a:t>
+            </a:r>
+            <a:r>
+              <a:rPr lang="en-US" altLang="zh-CN" dirty="0" err="1">
+                <a:ea typeface="宋体" panose="02010600030101010101" pitchFamily="2" charset="-122"/>
               </a:rPr>
-              <a:t>| I</a:t>
-            </a:r>
-            <a:r>
-              <a:rPr lang="en-US" altLang="zh-CN" sz="3600" b="1" strike="noStrike" spc="-1" dirty="0">
-                <a:solidFill>
-                  <a:srgbClr val="DE0000"/>
-                </a:solidFill>
-                <a:uFill>
-                  <a:solidFill>
-                    <a:srgbClr val="FFFFFF"/>
-                  </a:solidFill>
-                </a:uFill>
-                <a:latin typeface="Arial" panose="020B0604020202020204"/>
-                <a:ea typeface="DejaVu Sans"/>
-              </a:rPr>
-              <a:t>ntroduction</a:t>
-            </a:r>
-            <a:endParaRPr lang="zh-CN" altLang="en-US" dirty="0"/>
+              <a:t>Kcontrols</a:t>
+            </a:r>
+            <a:endParaRPr lang="en-US" dirty="0"/>
           </a:p>
         </p:txBody>
       </p:sp>
       <p:sp>
         <p:nvSpPr>
-          <p:cNvPr id="7" name="内容占位符 6">
+          <p:cNvPr id="3" name="Content Placeholder 2">
             <a:extLst>
               <a:ext uri="{FF2B5EF4-FFF2-40B4-BE49-F238E27FC236}">
-                <a16:creationId xmlns:a16="http://schemas.microsoft.com/office/drawing/2014/main" id="{88EE38F9-0269-4DD7-B0FE-B771F2A3C2A9}"/>
+                <a16:creationId xmlns:a16="http://schemas.microsoft.com/office/drawing/2014/main" id="{1DFF9790-7554-4E2A-91D9-E52505D6F838}"/>
               </a:ext>
             </a:extLst>
           </p:cNvPr>
@@ -12187,130 +12156,83 @@
             <p:ph idx="1"/>
           </p:nvPr>
         </p:nvSpPr>
-        <p:spPr/>
+        <p:spPr>
+          <a:xfrm>
+            <a:off x="444507" y="1048483"/>
+            <a:ext cx="5370367" cy="4945932"/>
+          </a:xfrm>
+        </p:spPr>
         <p:txBody>
           <a:bodyPr/>
           <a:lstStyle/>
           <a:p>
             <a:r>
-              <a:rPr lang="en-US" altLang="zh-CN" sz="2400" dirty="0"/>
-              <a:t>In order to debug driver freely, several driver nodes have been defined, </a:t>
-            </a:r>
-          </a:p>
-          <a:p>
-            <a:endParaRPr lang="en-US" altLang="zh-CN" dirty="0"/>
-          </a:p>
-          <a:p>
-            <a:endParaRPr lang="en-US" altLang="zh-CN" sz="2400" dirty="0"/>
-          </a:p>
-          <a:p>
-            <a:endParaRPr lang="en-US" altLang="zh-CN" dirty="0"/>
-          </a:p>
-          <a:p>
-            <a:endParaRPr lang="en-US" altLang="zh-CN" sz="2400" dirty="0"/>
-          </a:p>
-          <a:p>
-            <a:pPr marL="228600" marR="0" lvl="0" indent="-228600" algn="l" defTabSz="914400" rtl="0" eaLnBrk="1" fontAlgn="auto" latinLnBrk="0" hangingPunct="1">
-              <a:lnSpc>
-                <a:spcPct val="90000"/>
-              </a:lnSpc>
-              <a:spcBef>
-                <a:spcPts val="1000"/>
-              </a:spcBef>
-              <a:spcAft>
-                <a:spcPts val="0"/>
-              </a:spcAft>
-              <a:buClrTx/>
-              <a:buSzTx/>
-              <a:buFont typeface="Arial" panose="020B0604020202020204" pitchFamily="34" charset="0"/>
-              <a:buChar char="•"/>
-              <a:tabLst/>
-              <a:defRPr/>
+              <a:rPr lang="en-US" dirty="0"/>
+              <a:t>Please use below commands to check </a:t>
+            </a:r>
+            <a:r>
+              <a:rPr lang="en-US" dirty="0" err="1"/>
+              <a:t>Kcontrols</a:t>
+            </a:r>
+            <a:r>
+              <a:rPr lang="en-US" dirty="0"/>
+              <a:t> created in driver.</a:t>
+            </a:r>
+          </a:p>
+          <a:p>
+            <a:pPr marL="0" indent="0">
+              <a:buNone/>
             </a:pPr>
             <a:r>
-              <a:rPr lang="en-US" altLang="zh-CN" kern="1200" dirty="0">
-                <a:solidFill>
-                  <a:prstClr val="black"/>
-                </a:solidFill>
-                <a:latin typeface="Arial"/>
-              </a:rPr>
-              <a:t>Check below path to access above</a:t>
-            </a:r>
-            <a:r>
-              <a:rPr kumimoji="0" lang="en-US" altLang="zh-CN" sz="2400" b="0" i="0" u="none" strike="noStrike" kern="1200" cap="none" spc="0" normalizeH="0" baseline="0" noProof="0" dirty="0">
-                <a:ln>
-                  <a:noFill/>
-                </a:ln>
-                <a:solidFill>
-                  <a:prstClr val="black"/>
-                </a:solidFill>
-                <a:effectLst/>
-                <a:uLnTx/>
-                <a:uFillTx/>
-                <a:latin typeface="Arial"/>
-              </a:rPr>
-              <a:t> driver nodes</a:t>
-            </a:r>
-          </a:p>
-          <a:p>
-            <a:pPr marR="0" lvl="1" defTabSz="914400" latinLnBrk="0">
-              <a:lnSpc>
-                <a:spcPct val="90000"/>
-              </a:lnSpc>
-              <a:buClrTx/>
-              <a:buSzTx/>
-              <a:buFont typeface="Arial" panose="020B0604020202020204" pitchFamily="34" charset="0"/>
-              <a:buChar char="–"/>
-              <a:tabLst/>
-              <a:defRPr/>
+              <a:rPr lang="en-US" dirty="0"/>
+              <a:t>#</a:t>
+            </a:r>
+            <a:r>
+              <a:rPr lang="en-US" dirty="0" err="1"/>
+              <a:t>amixer</a:t>
+            </a:r>
+            <a:r>
+              <a:rPr lang="en-US" dirty="0"/>
+              <a:t> contents</a:t>
+            </a:r>
+          </a:p>
+          <a:p>
+            <a:endParaRPr lang="en-US" dirty="0"/>
+          </a:p>
+          <a:p>
+            <a:endParaRPr lang="en-US" dirty="0"/>
+          </a:p>
+          <a:p>
+            <a:endParaRPr lang="en-US" dirty="0"/>
+          </a:p>
+          <a:p>
+            <a:pPr marL="0" indent="0">
+              <a:buNone/>
             </a:pPr>
             <a:r>
-              <a:rPr lang="en-US" altLang="zh-CN" sz="2000" dirty="0"/>
-              <a:t>/sys/bus/i2c/devices/2-0038 </a:t>
-            </a:r>
-          </a:p>
-          <a:p>
-            <a:pPr marR="0" lvl="1" defTabSz="914400" latinLnBrk="0">
-              <a:lnSpc>
-                <a:spcPct val="90000"/>
-              </a:lnSpc>
-              <a:buClrTx/>
-              <a:buSzTx/>
-              <a:buFont typeface="Arial" panose="020B0604020202020204" pitchFamily="34" charset="0"/>
-              <a:buChar char="–"/>
-              <a:tabLst/>
-              <a:defRPr/>
-            </a:pPr>
-            <a:r>
-              <a:rPr lang="en-US" altLang="zh-CN" sz="2000" dirty="0"/>
-              <a:t>/sys/class/i2c-adapter/i2c-2/2-0038  </a:t>
-            </a:r>
-          </a:p>
-          <a:p>
-            <a:pPr marR="0" lvl="1" defTabSz="914400" latinLnBrk="0">
-              <a:lnSpc>
-                <a:spcPct val="90000"/>
-              </a:lnSpc>
-              <a:buClrTx/>
-              <a:buSzTx/>
-              <a:buFont typeface="Arial" panose="020B0604020202020204" pitchFamily="34" charset="0"/>
-              <a:buChar char="–"/>
-              <a:tabLst/>
-              <a:defRPr/>
-            </a:pPr>
-            <a:r>
-              <a:rPr lang="en-US" altLang="zh-CN" sz="2000" dirty="0"/>
-              <a:t>/sys/class/i2c-dev/i2c-2/device/2-0038</a:t>
-            </a:r>
+              <a:rPr lang="en-US" dirty="0"/>
+              <a:t>#</a:t>
+            </a:r>
+            <a:r>
+              <a:rPr lang="en-US" dirty="0" err="1"/>
+              <a:t>tinymixer</a:t>
+            </a:r>
+            <a:r>
+              <a:rPr lang="en-US" dirty="0"/>
+              <a:t> contents</a:t>
+            </a:r>
+          </a:p>
+          <a:p>
+            <a:endParaRPr lang="en-US" dirty="0"/>
           </a:p>
         </p:txBody>
       </p:sp>
       <p:sp>
         <p:nvSpPr>
-          <p:cNvPr id="5" name="灯片编号占位符 4">
+          <p:cNvPr id="4" name="Slide Number Placeholder 3">
             <a:extLst>
               <a:ext uri="{FF2B5EF4-FFF2-40B4-BE49-F238E27FC236}">
-                <a16:creationId xmlns:a16="http://schemas.microsoft.com/office/drawing/2014/main" id="{A0EB225E-7E2D-49AB-9C04-CAB0FF989B61}"/>
+                <a16:creationId xmlns:a16="http://schemas.microsoft.com/office/drawing/2014/main" id="{16412818-2695-473C-8A8A-31F406309BC5}"/>
               </a:ext>
             </a:extLst>
           </p:cNvPr>
@@ -12326,21 +12248,33 @@
           <a:bodyPr/>
           <a:lstStyle/>
           <a:p>
-            <a:pPr>
+            <a:pPr defTabSz="1219170" fontAlgn="base">
+              <a:spcBef>
+                <a:spcPct val="0"/>
+              </a:spcBef>
+              <a:spcAft>
+                <a:spcPct val="0"/>
+              </a:spcAft>
               <a:defRPr/>
             </a:pPr>
-            <a:fld id="{B53548F6-AAA9-4A8D-A869-511B3DFE3256}" type="slidenum">
+            <a:fld id="{2B97888F-6AF7-4263-B69D-592D8C33BAC7}" type="slidenum">
               <a:rPr lang="en-US" smtClean="0">
                 <a:solidFill>
                   <a:srgbClr val="000000"/>
                 </a:solidFill>
               </a:rPr>
-              <a:pPr>
+              <a:pPr defTabSz="1219170" fontAlgn="base">
+                <a:spcBef>
+                  <a:spcPct val="0"/>
+                </a:spcBef>
+                <a:spcAft>
+                  <a:spcPct val="0"/>
+                </a:spcAft>
                 <a:defRPr/>
               </a:pPr>
               <a:t>17</a:t>
             </a:fld>
-            <a:endParaRPr lang="en-US" dirty="0">
+            <a:endParaRPr lang="en-US">
               <a:solidFill>
                 <a:srgbClr val="000000"/>
               </a:solidFill>
@@ -12348,12 +12282,220 @@
           </a:p>
         </p:txBody>
       </p:sp>
+      <p:sp>
+        <p:nvSpPr>
+          <p:cNvPr id="5" name="Content Placeholder 2">
+            <a:extLst>
+              <a:ext uri="{FF2B5EF4-FFF2-40B4-BE49-F238E27FC236}">
+                <a16:creationId xmlns:a16="http://schemas.microsoft.com/office/drawing/2014/main" id="{265D64F6-086B-41CD-8CB1-9AB3534DA428}"/>
+              </a:ext>
+            </a:extLst>
+          </p:cNvPr>
+          <p:cNvSpPr txBox="1">
+            <a:spLocks/>
+          </p:cNvSpPr>
+          <p:nvPr/>
+        </p:nvSpPr>
+        <p:spPr bwMode="auto">
+          <a:xfrm>
+            <a:off x="6377126" y="1048483"/>
+            <a:ext cx="5370367" cy="4945932"/>
+          </a:xfrm>
+          <a:prstGeom prst="rect">
+            <a:avLst/>
+          </a:prstGeom>
+          <a:noFill/>
+          <a:ln w="9525" algn="ctr">
+            <a:noFill/>
+            <a:miter lim="800000"/>
+            <a:headEnd/>
+            <a:tailEnd/>
+          </a:ln>
+        </p:spPr>
+        <p:txBody>
+          <a:bodyPr vert="horz" wrap="square" lIns="76140" tIns="38067" rIns="76140" bIns="38067" numCol="1" anchor="t" anchorCtr="0" compatLnSpc="1">
+            <a:prstTxWarp prst="textNoShape">
+              <a:avLst/>
+            </a:prstTxWarp>
+          </a:bodyPr>
+          <a:lstStyle>
+            <a:lvl1pPr marL="252034" indent="-252034" algn="l" rtl="0" eaLnBrk="0" fontAlgn="base" hangingPunct="0">
+              <a:spcBef>
+                <a:spcPts val="889"/>
+              </a:spcBef>
+              <a:spcAft>
+                <a:spcPct val="0"/>
+              </a:spcAft>
+              <a:buChar char="•"/>
+              <a:defRPr sz="2400">
+                <a:solidFill>
+                  <a:schemeClr val="tx1"/>
+                </a:solidFill>
+                <a:latin typeface="+mn-lt"/>
+                <a:ea typeface="+mn-ea"/>
+                <a:cs typeface="+mn-cs"/>
+              </a:defRPr>
+            </a:lvl1pPr>
+            <a:lvl2pPr marL="638011" indent="-259088" algn="l" rtl="0" eaLnBrk="0" fontAlgn="base" hangingPunct="0">
+              <a:spcBef>
+                <a:spcPct val="20000"/>
+              </a:spcBef>
+              <a:spcAft>
+                <a:spcPct val="0"/>
+              </a:spcAft>
+              <a:buChar char="–"/>
+              <a:defRPr sz="2133">
+                <a:solidFill>
+                  <a:schemeClr val="tx1"/>
+                </a:solidFill>
+                <a:latin typeface="+mn-lt"/>
+              </a:defRPr>
+            </a:lvl2pPr>
+            <a:lvl3pPr marL="948199" indent="-183309" algn="l" rtl="0" eaLnBrk="0" fontAlgn="base" hangingPunct="0">
+              <a:spcBef>
+                <a:spcPct val="15000"/>
+              </a:spcBef>
+              <a:spcAft>
+                <a:spcPct val="0"/>
+              </a:spcAft>
+              <a:buChar char="•"/>
+              <a:defRPr sz="2000">
+                <a:solidFill>
+                  <a:schemeClr val="tx1"/>
+                </a:solidFill>
+                <a:latin typeface="+mn-lt"/>
+              </a:defRPr>
+            </a:lvl3pPr>
+            <a:lvl4pPr marL="1334177" indent="-259088" algn="l" rtl="0" eaLnBrk="0" fontAlgn="base" hangingPunct="0">
+              <a:spcBef>
+                <a:spcPct val="5000"/>
+              </a:spcBef>
+              <a:spcAft>
+                <a:spcPct val="0"/>
+              </a:spcAft>
+              <a:buChar char="–"/>
+              <a:defRPr sz="2000">
+                <a:solidFill>
+                  <a:schemeClr val="tx1"/>
+                </a:solidFill>
+                <a:latin typeface="+mn-lt"/>
+              </a:defRPr>
+            </a:lvl4pPr>
+            <a:lvl5pPr marL="1653172" indent="-192129" algn="l" rtl="0" eaLnBrk="0" fontAlgn="base" hangingPunct="0">
+              <a:spcBef>
+                <a:spcPct val="0"/>
+              </a:spcBef>
+              <a:spcAft>
+                <a:spcPct val="0"/>
+              </a:spcAft>
+              <a:buChar char="»"/>
+              <a:defRPr sz="2000">
+                <a:solidFill>
+                  <a:schemeClr val="tx1"/>
+                </a:solidFill>
+                <a:latin typeface="+mn-lt"/>
+              </a:defRPr>
+            </a:lvl5pPr>
+            <a:lvl6pPr marL="2160763" indent="-192129" algn="l" rtl="0" fontAlgn="base">
+              <a:spcBef>
+                <a:spcPct val="0"/>
+              </a:spcBef>
+              <a:spcAft>
+                <a:spcPct val="0"/>
+              </a:spcAft>
+              <a:buChar char="»"/>
+              <a:defRPr sz="1733">
+                <a:solidFill>
+                  <a:schemeClr val="tx1"/>
+                </a:solidFill>
+                <a:latin typeface="+mn-lt"/>
+              </a:defRPr>
+            </a:lvl6pPr>
+            <a:lvl7pPr marL="2668355" indent="-192129" algn="l" rtl="0" fontAlgn="base">
+              <a:spcBef>
+                <a:spcPct val="0"/>
+              </a:spcBef>
+              <a:spcAft>
+                <a:spcPct val="0"/>
+              </a:spcAft>
+              <a:buChar char="»"/>
+              <a:defRPr sz="1733">
+                <a:solidFill>
+                  <a:schemeClr val="tx1"/>
+                </a:solidFill>
+                <a:latin typeface="+mn-lt"/>
+              </a:defRPr>
+            </a:lvl7pPr>
+            <a:lvl8pPr marL="3175943" indent="-192129" algn="l" rtl="0" fontAlgn="base">
+              <a:spcBef>
+                <a:spcPct val="0"/>
+              </a:spcBef>
+              <a:spcAft>
+                <a:spcPct val="0"/>
+              </a:spcAft>
+              <a:buChar char="»"/>
+              <a:defRPr sz="1733">
+                <a:solidFill>
+                  <a:schemeClr val="tx1"/>
+                </a:solidFill>
+                <a:latin typeface="+mn-lt"/>
+              </a:defRPr>
+            </a:lvl8pPr>
+            <a:lvl9pPr marL="3683535" indent="-192129" algn="l" rtl="0" fontAlgn="base">
+              <a:spcBef>
+                <a:spcPct val="0"/>
+              </a:spcBef>
+              <a:spcAft>
+                <a:spcPct val="0"/>
+              </a:spcAft>
+              <a:buChar char="»"/>
+              <a:defRPr sz="1733">
+                <a:solidFill>
+                  <a:schemeClr val="tx1"/>
+                </a:solidFill>
+                <a:latin typeface="+mn-lt"/>
+              </a:defRPr>
+            </a:lvl9pPr>
+          </a:lstStyle>
+          <a:p>
+            <a:r>
+              <a:rPr lang="en-US" kern="0" dirty="0"/>
+              <a:t>Also we can use Graphical interface to adjust these </a:t>
+            </a:r>
+            <a:r>
+              <a:rPr lang="en-US" kern="0" dirty="0" err="1"/>
+              <a:t>kcontrols</a:t>
+            </a:r>
+            <a:r>
+              <a:rPr lang="en-US" kern="0" dirty="0"/>
+              <a:t>. Push esc to exit.</a:t>
+            </a:r>
+          </a:p>
+          <a:p>
+            <a:pPr marL="0" indent="0">
+              <a:buNone/>
+            </a:pPr>
+            <a:r>
+              <a:rPr lang="en-US" kern="0" dirty="0"/>
+              <a:t>#</a:t>
+            </a:r>
+            <a:r>
+              <a:rPr lang="en-US" kern="0" dirty="0" err="1"/>
+              <a:t>alsamixer</a:t>
+            </a:r>
+            <a:endParaRPr lang="en-US" kern="0" dirty="0"/>
+          </a:p>
+          <a:p>
+            <a:endParaRPr lang="en-US" kern="0" dirty="0"/>
+          </a:p>
+        </p:txBody>
+      </p:sp>
       <p:pic>
         <p:nvPicPr>
-          <p:cNvPr id="2" name="图片 1">
+          <p:cNvPr id="7" name="Picture 6">
             <a:extLst>
               <a:ext uri="{FF2B5EF4-FFF2-40B4-BE49-F238E27FC236}">
-                <a16:creationId xmlns:a16="http://schemas.microsoft.com/office/drawing/2014/main" id="{1CD8C53E-3CCF-FC6A-2E4D-EAFCE02F2512}"/>
+                <a16:creationId xmlns:a16="http://schemas.microsoft.com/office/drawing/2014/main" id="{6E4A58BF-B220-4297-9476-D25F48C24499}"/>
               </a:ext>
             </a:extLst>
           </p:cNvPr>
@@ -12363,15 +12505,93 @@
           <p:nvPr/>
         </p:nvPicPr>
         <p:blipFill>
-          <a:blip r:embed="rId2"/>
+          <a:blip r:embed="rId2">
+            <a:extLst>
+              <a:ext uri="{28A0092B-C50C-407E-A947-70E740481C1C}">
+                <a14:useLocalDpi xmlns:a14="http://schemas.microsoft.com/office/drawing/2010/main" val="0"/>
+              </a:ext>
+            </a:extLst>
+          </a:blip>
           <a:stretch>
             <a:fillRect/>
           </a:stretch>
         </p:blipFill>
         <p:spPr>
           <a:xfrm>
-            <a:off x="846260" y="1659914"/>
-            <a:ext cx="7427124" cy="801932"/>
+            <a:off x="493923" y="2302911"/>
+            <a:ext cx="4860881" cy="1540892"/>
+          </a:xfrm>
+          <a:prstGeom prst="rect">
+            <a:avLst/>
+          </a:prstGeom>
+        </p:spPr>
+      </p:pic>
+      <p:pic>
+        <p:nvPicPr>
+          <p:cNvPr id="13" name="Picture 12">
+            <a:extLst>
+              <a:ext uri="{FF2B5EF4-FFF2-40B4-BE49-F238E27FC236}">
+                <a16:creationId xmlns:a16="http://schemas.microsoft.com/office/drawing/2014/main" id="{13E076F8-A652-4623-ACB6-70FA5D5A98A2}"/>
+              </a:ext>
+            </a:extLst>
+          </p:cNvPr>
+          <p:cNvPicPr>
+            <a:picLocks noChangeAspect="1"/>
+          </p:cNvPicPr>
+          <p:nvPr/>
+        </p:nvPicPr>
+        <p:blipFill>
+          <a:blip r:embed="rId3">
+            <a:extLst>
+              <a:ext uri="{28A0092B-C50C-407E-A947-70E740481C1C}">
+                <a14:useLocalDpi xmlns:a14="http://schemas.microsoft.com/office/drawing/2010/main" val="0"/>
+              </a:ext>
+            </a:extLst>
+          </a:blip>
+          <a:stretch>
+            <a:fillRect/>
+          </a:stretch>
+        </p:blipFill>
+        <p:spPr>
+          <a:xfrm>
+            <a:off x="6437126" y="2831716"/>
+            <a:ext cx="5260951" cy="3135838"/>
+          </a:xfrm>
+          <a:prstGeom prst="rect">
+            <a:avLst/>
+          </a:prstGeom>
+        </p:spPr>
+      </p:pic>
+      <p:pic>
+        <p:nvPicPr>
+          <p:cNvPr id="15" name="Picture 14">
+            <a:extLst>
+              <a:ext uri="{FF2B5EF4-FFF2-40B4-BE49-F238E27FC236}">
+                <a16:creationId xmlns:a16="http://schemas.microsoft.com/office/drawing/2014/main" id="{8C13EAAC-3A4F-494D-9054-30364DB03DDE}"/>
+              </a:ext>
+            </a:extLst>
+          </p:cNvPr>
+          <p:cNvPicPr>
+            <a:picLocks noChangeAspect="1"/>
+          </p:cNvPicPr>
+          <p:nvPr/>
+        </p:nvPicPr>
+        <p:blipFill>
+          <a:blip r:embed="rId4">
+            <a:extLst>
+              <a:ext uri="{28A0092B-C50C-407E-A947-70E740481C1C}">
+                <a14:useLocalDpi xmlns:a14="http://schemas.microsoft.com/office/drawing/2010/main" val="0"/>
+              </a:ext>
+            </a:extLst>
+          </a:blip>
+          <a:stretch>
+            <a:fillRect/>
+          </a:stretch>
+        </p:blipFill>
+        <p:spPr>
+          <a:xfrm>
+            <a:off x="475297" y="4399635"/>
+            <a:ext cx="5871829" cy="929766"/>
           </a:xfrm>
           <a:prstGeom prst="rect">
             <a:avLst/>
@@ -12381,7 +12601,7 @@
     </p:spTree>
     <p:extLst>
       <p:ext uri="{BB962C8B-B14F-4D97-AF65-F5344CB8AC3E}">
-        <p14:creationId xmlns:p14="http://schemas.microsoft.com/office/powerpoint/2010/main" val="4271154118"/>
+        <p14:creationId xmlns:p14="http://schemas.microsoft.com/office/powerpoint/2010/main" val="987250736"/>
       </p:ext>
     </p:extLst>
   </p:cSld>
@@ -12442,7 +12662,7 @@
                 <a:latin typeface="Arial" panose="020B0604020202020204"/>
                 <a:ea typeface="DejaVu Sans"/>
               </a:rPr>
-              <a:t>Driver nodes II </a:t>
+              <a:t>Driver nodes I </a:t>
             </a:r>
             <a:r>
               <a:rPr lang="en-US" altLang="zh-CN" spc="-1" dirty="0">
@@ -12457,7 +12677,7 @@
                 <a:latin typeface="Arial" panose="020B0604020202020204"/>
                 <a:ea typeface="DejaVu Sans"/>
               </a:rPr>
-              <a:t>|</a:t>
+              <a:t>| I</a:t>
             </a:r>
             <a:r>
               <a:rPr lang="en-US" altLang="zh-CN" sz="3600" b="1" strike="noStrike" spc="-1" dirty="0">
@@ -12472,19 +12692,7 @@
                 <a:latin typeface="Arial" panose="020B0604020202020204"/>
                 <a:ea typeface="DejaVu Sans"/>
               </a:rPr>
-              <a:t> </a:t>
-            </a:r>
-            <a:r>
-              <a:rPr lang="en-US" altLang="zh-CN" sz="3600" dirty="0"/>
-              <a:t>i2caddr</a:t>
-            </a:r>
-            <a:r>
-              <a:rPr lang="en-US" altLang="zh-CN" dirty="0"/>
-              <a:t>/</a:t>
-            </a:r>
-            <a:r>
-              <a:rPr lang="en-US" altLang="zh-CN" dirty="0" err="1"/>
-              <a:t>devinfo</a:t>
+              <a:t>ntroduction</a:t>
             </a:r>
             <a:endParaRPr lang="zh-CN" altLang="en-US" dirty="0"/>
           </a:p>
@@ -12492,10 +12700,10 @@
       </p:sp>
       <p:sp>
         <p:nvSpPr>
-          <p:cNvPr id="11" name="Content Placeholder 10">
+          <p:cNvPr id="7" name="内容占位符 6">
             <a:extLst>
               <a:ext uri="{FF2B5EF4-FFF2-40B4-BE49-F238E27FC236}">
-                <a16:creationId xmlns:a16="http://schemas.microsoft.com/office/drawing/2014/main" id="{1665BE40-D67D-476F-BDEE-FEC4215908B4}"/>
+                <a16:creationId xmlns:a16="http://schemas.microsoft.com/office/drawing/2014/main" id="{88EE38F9-0269-4DD7-B0FE-B771F2A3C2A9}"/>
               </a:ext>
             </a:extLst>
           </p:cNvPr>
@@ -12503,7 +12711,7 @@
             <a:spLocks noGrp="1"/>
           </p:cNvSpPr>
           <p:nvPr>
-            <p:ph sz="half" idx="1"/>
+            <p:ph idx="1"/>
           </p:nvPr>
         </p:nvSpPr>
         <p:spPr/>
@@ -12513,132 +12721,114 @@
           <a:p>
             <a:r>
               <a:rPr lang="en-US" altLang="zh-CN" sz="2400" dirty="0"/>
-              <a:t>#</a:t>
-            </a:r>
-            <a:r>
-              <a:rPr lang="en-US" altLang="zh-CN" sz="2400" dirty="0" err="1"/>
-              <a:t>amixer</a:t>
-            </a:r>
-            <a:r>
-              <a:rPr lang="en-US" altLang="zh-CN" sz="2400" dirty="0"/>
-              <a:t> contents</a:t>
-            </a:r>
-            <a:endParaRPr lang="en-US" altLang="zh-CN" sz="1800" dirty="0"/>
-          </a:p>
-          <a:p>
-            <a:pPr marL="454846" lvl="1" indent="0">
-              <a:buFontTx/>
-              <a:buNone/>
+              <a:t>In order to debug driver freely, several driver nodes have been defined, </a:t>
+            </a:r>
+          </a:p>
+          <a:p>
+            <a:endParaRPr lang="en-US" altLang="zh-CN" dirty="0"/>
+          </a:p>
+          <a:p>
+            <a:endParaRPr lang="en-US" altLang="zh-CN" sz="2400" dirty="0"/>
+          </a:p>
+          <a:p>
+            <a:endParaRPr lang="en-US" altLang="zh-CN" dirty="0"/>
+          </a:p>
+          <a:p>
+            <a:endParaRPr lang="en-US" altLang="zh-CN" sz="2400" dirty="0"/>
+          </a:p>
+          <a:p>
+            <a:pPr marL="228600" marR="0" lvl="0" indent="-228600" algn="l" defTabSz="914400" rtl="0" eaLnBrk="1" fontAlgn="auto" latinLnBrk="0" hangingPunct="1">
+              <a:lnSpc>
+                <a:spcPct val="90000"/>
+              </a:lnSpc>
+              <a:spcBef>
+                <a:spcPts val="1000"/>
+              </a:spcBef>
+              <a:spcAft>
+                <a:spcPts val="0"/>
+              </a:spcAft>
+              <a:buClrTx/>
+              <a:buSzTx/>
+              <a:buFont typeface="Arial" panose="020B0604020202020204" pitchFamily="34" charset="0"/>
+              <a:buChar char="•"/>
+              <a:tabLst/>
+              <a:defRPr/>
             </a:pPr>
-            <a:endParaRPr lang="en-US" altLang="zh-CN" sz="1800" dirty="0"/>
-          </a:p>
-          <a:p>
-            <a:pPr marL="454846" lvl="1" indent="0">
-              <a:buFontTx/>
-              <a:buNone/>
+            <a:r>
+              <a:rPr lang="en-US" altLang="zh-CN" kern="1200" dirty="0">
+                <a:solidFill>
+                  <a:prstClr val="black"/>
+                </a:solidFill>
+                <a:latin typeface="Arial"/>
+              </a:rPr>
+              <a:t>Check below path to access above</a:t>
+            </a:r>
+            <a:r>
+              <a:rPr kumimoji="0" lang="en-US" altLang="zh-CN" sz="2400" b="0" i="0" u="none" strike="noStrike" kern="1200" cap="none" spc="0" normalizeH="0" baseline="0" noProof="0" dirty="0">
+                <a:ln>
+                  <a:noFill/>
+                </a:ln>
+                <a:solidFill>
+                  <a:prstClr val="black"/>
+                </a:solidFill>
+                <a:effectLst/>
+                <a:uLnTx/>
+                <a:uFillTx/>
+                <a:latin typeface="Arial"/>
+              </a:rPr>
+              <a:t> driver nodes</a:t>
+            </a:r>
+          </a:p>
+          <a:p>
+            <a:pPr marR="0" lvl="1" defTabSz="914400" latinLnBrk="0">
+              <a:lnSpc>
+                <a:spcPct val="90000"/>
+              </a:lnSpc>
+              <a:buClrTx/>
+              <a:buSzTx/>
+              <a:buFont typeface="Arial" panose="020B0604020202020204" pitchFamily="34" charset="0"/>
+              <a:buChar char="–"/>
+              <a:tabLst/>
+              <a:defRPr/>
             </a:pPr>
-            <a:endParaRPr lang="en-US" altLang="zh-CN" sz="1800" dirty="0"/>
-          </a:p>
-          <a:p>
-            <a:pPr marL="454846" lvl="1" indent="0">
-              <a:buFontTx/>
-              <a:buNone/>
+            <a:r>
+              <a:rPr lang="en-US" altLang="zh-CN" sz="2000" dirty="0"/>
+              <a:t>/sys/bus/i2c/devices/2-0038 </a:t>
+            </a:r>
+          </a:p>
+          <a:p>
+            <a:pPr marR="0" lvl="1" defTabSz="914400" latinLnBrk="0">
+              <a:lnSpc>
+                <a:spcPct val="90000"/>
+              </a:lnSpc>
+              <a:buClrTx/>
+              <a:buSzTx/>
+              <a:buFont typeface="Arial" panose="020B0604020202020204" pitchFamily="34" charset="0"/>
+              <a:buChar char="–"/>
+              <a:tabLst/>
+              <a:defRPr/>
             </a:pPr>
-            <a:endParaRPr lang="en-US" altLang="zh-CN" sz="1800" dirty="0"/>
-          </a:p>
-          <a:p>
-            <a:pPr marL="797746" lvl="1" indent="-342900">
-              <a:buFont typeface="+mj-lt"/>
-              <a:buAutoNum type="arabicPeriod" startAt="2"/>
+            <a:r>
+              <a:rPr lang="en-US" altLang="zh-CN" sz="2000" dirty="0"/>
+              <a:t>/sys/class/i2c-adapter/i2c-2/2-0038  </a:t>
+            </a:r>
+          </a:p>
+          <a:p>
+            <a:pPr marR="0" lvl="1" defTabSz="914400" latinLnBrk="0">
+              <a:lnSpc>
+                <a:spcPct val="90000"/>
+              </a:lnSpc>
+              <a:buClrTx/>
+              <a:buSzTx/>
+              <a:buFont typeface="Arial" panose="020B0604020202020204" pitchFamily="34" charset="0"/>
+              <a:buChar char="–"/>
+              <a:tabLst/>
+              <a:defRPr/>
             </a:pPr>
-            <a:endParaRPr lang="en-US" altLang="zh-CN" sz="1800" dirty="0"/>
-          </a:p>
-          <a:p>
-            <a:endParaRPr lang="en-US" dirty="0"/>
-          </a:p>
-        </p:txBody>
-      </p:sp>
-      <p:sp>
-        <p:nvSpPr>
-          <p:cNvPr id="2" name="内容占位符 1">
-            <a:extLst>
-              <a:ext uri="{FF2B5EF4-FFF2-40B4-BE49-F238E27FC236}">
-                <a16:creationId xmlns:a16="http://schemas.microsoft.com/office/drawing/2014/main" id="{556A71DF-A4C2-4CFD-B5BB-EB96FD0D488C}"/>
-              </a:ext>
-            </a:extLst>
-          </p:cNvPr>
-          <p:cNvSpPr>
-            <a:spLocks noGrp="1"/>
-          </p:cNvSpPr>
-          <p:nvPr>
-            <p:ph sz="half" idx="2"/>
-          </p:nvPr>
-        </p:nvSpPr>
-        <p:spPr/>
-        <p:txBody>
-          <a:bodyPr/>
-          <a:lstStyle/>
-          <a:p>
-            <a:r>
-              <a:rPr lang="en-US" altLang="zh-CN" sz="2400" dirty="0"/>
-              <a:t>#cat </a:t>
-            </a:r>
-            <a:r>
-              <a:rPr lang="en-US" altLang="zh-CN" sz="2400" dirty="0" err="1"/>
-              <a:t>dev_addr</a:t>
-            </a:r>
-            <a:endParaRPr lang="en-US" altLang="zh-CN" sz="2400" dirty="0"/>
-          </a:p>
-          <a:p>
-            <a:pPr marL="454846" lvl="1" indent="0">
-              <a:buNone/>
-            </a:pPr>
-            <a:r>
-              <a:rPr lang="en-US" altLang="zh-CN" dirty="0"/>
-              <a:t>Illustration: show the active i2c address</a:t>
-            </a:r>
-          </a:p>
-          <a:p>
-            <a:pPr marL="454846" lvl="1" indent="0">
-              <a:buNone/>
-            </a:pPr>
-            <a:endParaRPr lang="en-US" altLang="zh-CN" sz="1800" dirty="0"/>
-          </a:p>
-          <a:p>
-            <a:pPr marL="454846" lvl="1" indent="0">
-              <a:buNone/>
-            </a:pPr>
-            <a:endParaRPr lang="en-US" altLang="zh-CN" sz="1800" dirty="0"/>
-          </a:p>
-          <a:p>
-            <a:r>
-              <a:rPr lang="en-US" altLang="zh-CN" sz="2400" dirty="0"/>
-              <a:t>#cat </a:t>
-            </a:r>
-            <a:r>
-              <a:rPr lang="en-US" altLang="zh-CN" sz="2400" dirty="0" err="1"/>
-              <a:t>devinfo</a:t>
-            </a:r>
-            <a:endParaRPr lang="en-US" altLang="zh-CN" sz="2400" dirty="0"/>
-          </a:p>
-          <a:p>
-            <a:pPr marL="379041" lvl="1" indent="0">
-              <a:buNone/>
-            </a:pPr>
-            <a:r>
-              <a:rPr lang="en-US" altLang="zh-CN" dirty="0"/>
-              <a:t>Illustration: Get the basic information of audio device on the board</a:t>
-            </a:r>
-            <a:endParaRPr lang="zh-CN" altLang="en-US" dirty="0"/>
-          </a:p>
-          <a:p>
-            <a:pPr marL="454846" lvl="1" indent="0">
-              <a:buNone/>
-            </a:pPr>
-            <a:endParaRPr lang="en-US" altLang="zh-CN" sz="1800" dirty="0"/>
-          </a:p>
-          <a:p>
-            <a:endParaRPr lang="zh-CN" altLang="en-US" dirty="0"/>
+            <a:r>
+              <a:rPr lang="en-US" altLang="zh-CN" sz="2000" dirty="0"/>
+              <a:t>/sys/class/i2c-dev/i2c-2/device/2-0038</a:t>
+            </a:r>
           </a:p>
         </p:txBody>
       </p:sp>
@@ -12687,10 +12877,10 @@
       </p:sp>
       <p:pic>
         <p:nvPicPr>
-          <p:cNvPr id="3" name="图片 2">
+          <p:cNvPr id="2" name="图片 1">
             <a:extLst>
               <a:ext uri="{FF2B5EF4-FFF2-40B4-BE49-F238E27FC236}">
-                <a16:creationId xmlns:a16="http://schemas.microsoft.com/office/drawing/2014/main" id="{A27898F0-27DF-706F-983C-F5C6339BD746}"/>
+                <a16:creationId xmlns:a16="http://schemas.microsoft.com/office/drawing/2014/main" id="{1CD8C53E-3CCF-FC6A-2E4D-EAFCE02F2512}"/>
               </a:ext>
             </a:extLst>
           </p:cNvPr>
@@ -12707,68 +12897,8 @@
         </p:blipFill>
         <p:spPr>
           <a:xfrm>
-            <a:off x="457199" y="1597428"/>
-            <a:ext cx="5942001" cy="1605329"/>
-          </a:xfrm>
-          <a:prstGeom prst="rect">
-            <a:avLst/>
-          </a:prstGeom>
-        </p:spPr>
-      </p:pic>
-      <p:pic>
-        <p:nvPicPr>
-          <p:cNvPr id="12" name="图片 11">
-            <a:extLst>
-              <a:ext uri="{FF2B5EF4-FFF2-40B4-BE49-F238E27FC236}">
-                <a16:creationId xmlns:a16="http://schemas.microsoft.com/office/drawing/2014/main" id="{69B9EDFA-400B-CF12-4415-EE14725E9C1D}"/>
-              </a:ext>
-            </a:extLst>
-          </p:cNvPr>
-          <p:cNvPicPr>
-            <a:picLocks noChangeAspect="1"/>
-          </p:cNvPicPr>
-          <p:nvPr/>
-        </p:nvPicPr>
-        <p:blipFill>
-          <a:blip r:embed="rId3"/>
-          <a:stretch>
-            <a:fillRect/>
-          </a:stretch>
-        </p:blipFill>
-        <p:spPr>
-          <a:xfrm>
-            <a:off x="6696076" y="2028155"/>
-            <a:ext cx="4533900" cy="457200"/>
-          </a:xfrm>
-          <a:prstGeom prst="rect">
-            <a:avLst/>
-          </a:prstGeom>
-        </p:spPr>
-      </p:pic>
-      <p:pic>
-        <p:nvPicPr>
-          <p:cNvPr id="13" name="图片 12">
-            <a:extLst>
-              <a:ext uri="{FF2B5EF4-FFF2-40B4-BE49-F238E27FC236}">
-                <a16:creationId xmlns:a16="http://schemas.microsoft.com/office/drawing/2014/main" id="{40FEA9D9-F27E-14FC-5C5B-0453FF2A0B1B}"/>
-              </a:ext>
-            </a:extLst>
-          </p:cNvPr>
-          <p:cNvPicPr>
-            <a:picLocks noChangeAspect="1"/>
-          </p:cNvPicPr>
-          <p:nvPr/>
-        </p:nvPicPr>
-        <p:blipFill>
-          <a:blip r:embed="rId4"/>
-          <a:stretch>
-            <a:fillRect/>
-          </a:stretch>
-        </p:blipFill>
-        <p:spPr>
-          <a:xfrm>
-            <a:off x="6598708" y="3784845"/>
-            <a:ext cx="4514850" cy="457200"/>
+            <a:off x="846260" y="1659914"/>
+            <a:ext cx="7427124" cy="801932"/>
           </a:xfrm>
           <a:prstGeom prst="rect">
             <a:avLst/>
@@ -12778,7 +12908,7 @@
     </p:spTree>
     <p:extLst>
       <p:ext uri="{BB962C8B-B14F-4D97-AF65-F5344CB8AC3E}">
-        <p14:creationId xmlns:p14="http://schemas.microsoft.com/office/powerpoint/2010/main" val="1953372526"/>
+        <p14:creationId xmlns:p14="http://schemas.microsoft.com/office/powerpoint/2010/main" val="4271154118"/>
       </p:ext>
     </p:extLst>
   </p:cSld>
@@ -12869,7 +12999,19 @@
                 <a:latin typeface="Arial" panose="020B0604020202020204"/>
                 <a:ea typeface="DejaVu Sans"/>
               </a:rPr>
-              <a:t> reg</a:t>
+              <a:t> </a:t>
+            </a:r>
+            <a:r>
+              <a:rPr lang="en-US" altLang="zh-CN" sz="3600" dirty="0"/>
+              <a:t>i2caddr</a:t>
+            </a:r>
+            <a:r>
+              <a:rPr lang="en-US" altLang="zh-CN" dirty="0"/>
+              <a:t>/</a:t>
+            </a:r>
+            <a:r>
+              <a:rPr lang="en-US" altLang="zh-CN" dirty="0" err="1"/>
+              <a:t>devinfo</a:t>
             </a:r>
             <a:endParaRPr lang="zh-CN" altLang="en-US" dirty="0"/>
           </a:p>
@@ -12877,10 +13019,10 @@
       </p:sp>
       <p:sp>
         <p:nvSpPr>
-          <p:cNvPr id="7" name="内容占位符 6">
+          <p:cNvPr id="2" name="内容占位符 1">
             <a:extLst>
               <a:ext uri="{FF2B5EF4-FFF2-40B4-BE49-F238E27FC236}">
-                <a16:creationId xmlns:a16="http://schemas.microsoft.com/office/drawing/2014/main" id="{88EE38F9-0269-4DD7-B0FE-B771F2A3C2A9}"/>
+                <a16:creationId xmlns:a16="http://schemas.microsoft.com/office/drawing/2014/main" id="{556A71DF-A4C2-4CFD-B5BB-EB96FD0D488C}"/>
               </a:ext>
             </a:extLst>
           </p:cNvPr>
@@ -12888,87 +13030,79 @@
             <a:spLocks noGrp="1"/>
           </p:cNvSpPr>
           <p:nvPr>
-            <p:ph idx="1"/>
+            <p:ph sz="half" idx="2"/>
           </p:nvPr>
         </p:nvSpPr>
-        <p:spPr/>
+        <p:spPr>
+          <a:xfrm>
+            <a:off x="552451" y="957282"/>
+            <a:ext cx="5543549" cy="4692651"/>
+          </a:xfrm>
+        </p:spPr>
         <p:txBody>
           <a:bodyPr/>
           <a:lstStyle/>
           <a:p>
             <a:r>
               <a:rPr lang="en-US" altLang="zh-CN" sz="2400" dirty="0"/>
-              <a:t>#echo </a:t>
+              <a:t>#cat </a:t>
             </a:r>
             <a:r>
               <a:rPr lang="en-US" altLang="zh-CN" sz="2400" dirty="0" err="1"/>
-              <a:t>chn</a:t>
-            </a:r>
-            <a:r>
-              <a:rPr lang="en-US" altLang="zh-CN" sz="2400" dirty="0"/>
-              <a:t> 0xBK 0xPG 0xRG 0xXX &gt; reg</a:t>
-            </a:r>
+              <a:t>dev_addr</a:t>
+            </a:r>
+            <a:endParaRPr lang="en-US" altLang="zh-CN" sz="2400" dirty="0"/>
           </a:p>
           <a:p>
             <a:pPr marL="454846" lvl="1" indent="0">
               <a:buNone/>
             </a:pPr>
             <a:r>
-              <a:rPr lang="en-US" altLang="zh-CN" sz="1600" dirty="0"/>
-              <a:t>Illustration: Write a value to a certain register</a:t>
-            </a:r>
-          </a:p>
-          <a:p>
-            <a:pPr lvl="1"/>
-            <a:r>
-              <a:rPr lang="en-US" altLang="zh-CN" sz="1600" dirty="0" err="1"/>
-              <a:t>chn</a:t>
-            </a:r>
-            <a:r>
-              <a:rPr lang="en-US" altLang="zh-CN" sz="1600" dirty="0"/>
-              <a:t> is channel no, must be 1-digital</a:t>
-            </a:r>
-          </a:p>
-          <a:p>
-            <a:pPr lvl="1"/>
-            <a:r>
-              <a:rPr lang="en-US" altLang="zh-CN" sz="1600" dirty="0"/>
-              <a:t>BK, PG, RG &amp; XX must be 2-digital HEX</a:t>
-            </a:r>
-          </a:p>
-          <a:p>
-            <a:pPr lvl="1"/>
-            <a:r>
-              <a:rPr lang="en-US" altLang="zh-CN" sz="1600" dirty="0" err="1"/>
-              <a:t>eg</a:t>
-            </a:r>
-            <a:r>
-              <a:rPr lang="en-US" altLang="zh-CN" sz="1600" dirty="0"/>
-              <a:t>: 0 0x00 </a:t>
-            </a:r>
-            <a:r>
-              <a:rPr lang="en-US" altLang="zh-CN" sz="1600" dirty="0" err="1"/>
-              <a:t>0x00</a:t>
-            </a:r>
-            <a:r>
-              <a:rPr lang="en-US" altLang="zh-CN" sz="1600" dirty="0"/>
-              <a:t> 0x05 0x07 &gt; reg</a:t>
-            </a:r>
-          </a:p>
-          <a:p>
-            <a:r>
-              <a:rPr lang="en-US" altLang="zh-CN" sz="2400" dirty="0"/>
-              <a:t>#cat reg</a:t>
+              <a:rPr lang="en-US" altLang="zh-CN" dirty="0"/>
+              <a:t>Illustration: show the active i2c address</a:t>
             </a:r>
           </a:p>
           <a:p>
             <a:pPr marL="454846" lvl="1" indent="0">
               <a:buNone/>
             </a:pPr>
-            <a:r>
-              <a:rPr lang="en-US" altLang="zh-CN" sz="1600" dirty="0"/>
-              <a:t>Illustration: Read back the value from the register which have been echoed before</a:t>
-            </a:r>
+            <a:endParaRPr lang="en-US" altLang="zh-CN" sz="1800" dirty="0"/>
+          </a:p>
+          <a:p>
+            <a:pPr marL="454846" lvl="1" indent="0">
+              <a:buNone/>
+            </a:pPr>
+            <a:endParaRPr lang="en-US" altLang="zh-CN" sz="1800" dirty="0"/>
+          </a:p>
+          <a:p>
+            <a:r>
+              <a:rPr lang="en-US" altLang="zh-CN" sz="2400" dirty="0"/>
+              <a:t>#cat </a:t>
+            </a:r>
+            <a:r>
+              <a:rPr lang="en-US" altLang="zh-CN" sz="2400" dirty="0" err="1"/>
+              <a:t>devinfo</a:t>
+            </a:r>
+            <a:endParaRPr lang="en-US" altLang="zh-CN" sz="2400" dirty="0"/>
+          </a:p>
+          <a:p>
+            <a:pPr marL="379041" lvl="1" indent="0">
+              <a:buNone/>
+            </a:pPr>
+            <a:r>
+              <a:rPr lang="en-US" altLang="zh-CN" dirty="0"/>
+              <a:t>Illustration: Get the basic information of audio device on the board</a:t>
+            </a:r>
+            <a:endParaRPr lang="zh-CN" altLang="en-US" dirty="0"/>
+          </a:p>
+          <a:p>
+            <a:pPr marL="454846" lvl="1" indent="0">
+              <a:buNone/>
+            </a:pPr>
+            <a:endParaRPr lang="en-US" altLang="zh-CN" sz="1800" dirty="0"/>
+          </a:p>
+          <a:p>
+            <a:endParaRPr lang="zh-CN" altLang="en-US" dirty="0"/>
           </a:p>
         </p:txBody>
       </p:sp>
@@ -12988,7 +13122,12 @@
             <p:ph type="sldNum" sz="quarter" idx="10"/>
           </p:nvPr>
         </p:nvSpPr>
-        <p:spPr/>
+        <p:spPr>
+          <a:xfrm>
+            <a:off x="3217332" y="5754169"/>
+            <a:ext cx="2844800" cy="206376"/>
+          </a:xfrm>
+        </p:spPr>
         <p:txBody>
           <a:bodyPr/>
           <a:lstStyle/>
@@ -13017,10 +13156,10 @@
       </p:sp>
       <p:pic>
         <p:nvPicPr>
-          <p:cNvPr id="2" name="图片 1">
+          <p:cNvPr id="12" name="图片 11">
             <a:extLst>
               <a:ext uri="{FF2B5EF4-FFF2-40B4-BE49-F238E27FC236}">
-                <a16:creationId xmlns:a16="http://schemas.microsoft.com/office/drawing/2014/main" id="{07F66BED-2FB2-FD3C-6EEB-23DD2175CE4C}"/>
+                <a16:creationId xmlns:a16="http://schemas.microsoft.com/office/drawing/2014/main" id="{69B9EDFA-400B-CF12-4415-EE14725E9C1D}"/>
               </a:ext>
             </a:extLst>
           </p:cNvPr>
@@ -13037,8 +13176,38 @@
         </p:blipFill>
         <p:spPr>
           <a:xfrm>
-            <a:off x="892419" y="3585429"/>
-            <a:ext cx="8172450" cy="824859"/>
+            <a:off x="1057275" y="1799572"/>
+            <a:ext cx="4533900" cy="457200"/>
+          </a:xfrm>
+          <a:prstGeom prst="rect">
+            <a:avLst/>
+          </a:prstGeom>
+        </p:spPr>
+      </p:pic>
+      <p:pic>
+        <p:nvPicPr>
+          <p:cNvPr id="13" name="图片 12">
+            <a:extLst>
+              <a:ext uri="{FF2B5EF4-FFF2-40B4-BE49-F238E27FC236}">
+                <a16:creationId xmlns:a16="http://schemas.microsoft.com/office/drawing/2014/main" id="{40FEA9D9-F27E-14FC-5C5B-0453FF2A0B1B}"/>
+              </a:ext>
+            </a:extLst>
+          </p:cNvPr>
+          <p:cNvPicPr>
+            <a:picLocks noChangeAspect="1"/>
+          </p:cNvPicPr>
+          <p:nvPr/>
+        </p:nvPicPr>
+        <p:blipFill>
+          <a:blip r:embed="rId3"/>
+          <a:stretch>
+            <a:fillRect/>
+          </a:stretch>
+        </p:blipFill>
+        <p:spPr>
+          <a:xfrm>
+            <a:off x="959907" y="3556262"/>
+            <a:ext cx="4514850" cy="457200"/>
           </a:xfrm>
           <a:prstGeom prst="rect">
             <a:avLst/>
@@ -13048,7 +13217,7 @@
     </p:spTree>
     <p:extLst>
       <p:ext uri="{BB962C8B-B14F-4D97-AF65-F5344CB8AC3E}">
-        <p14:creationId xmlns:p14="http://schemas.microsoft.com/office/powerpoint/2010/main" val="864682733"/>
+        <p14:creationId xmlns:p14="http://schemas.microsoft.com/office/powerpoint/2010/main" val="1953372526"/>
       </p:ext>
     </p:extLst>
   </p:cSld>
@@ -13355,7 +13524,7 @@
                 <a:buFontTx/>
                 <a:buNone/>
               </a:pPr>
-              <a:t>10/12/2022</a:t>
+              <a:t>10/14/2022</a:t>
             </a:fld>
             <a:endParaRPr lang="en-US" altLang="zh-CN" sz="1000">
               <a:ea typeface="宋体" panose="02010600030101010101" pitchFamily="2" charset="-122"/>
@@ -22061,11 +22230,37 @@
                 <a:latin typeface="Arial" panose="020B0604020202020204"/>
                 <a:ea typeface="DejaVu Sans"/>
               </a:rPr>
-              <a:t>Driver nodes III | </a:t>
-            </a:r>
-            <a:r>
-              <a:rPr lang="en-US" altLang="zh-CN" sz="3600" dirty="0" err="1"/>
-              <a:t>regdump</a:t>
+              <a:t>Driver nodes II </a:t>
+            </a:r>
+            <a:r>
+              <a:rPr lang="en-US" altLang="zh-CN" spc="-1" dirty="0">
+                <a:solidFill>
+                  <a:srgbClr val="DE0000"/>
+                </a:solidFill>
+                <a:uFill>
+                  <a:solidFill>
+                    <a:srgbClr val="FFFFFF"/>
+                  </a:solidFill>
+                </a:uFill>
+                <a:latin typeface="Arial" panose="020B0604020202020204"/>
+                <a:ea typeface="DejaVu Sans"/>
+              </a:rPr>
+              <a:t>|</a:t>
+            </a:r>
+            <a:r>
+              <a:rPr lang="en-US" altLang="zh-CN" sz="3600" b="1" strike="noStrike" spc="-1" dirty="0">
+                <a:solidFill>
+                  <a:srgbClr val="DE0000"/>
+                </a:solidFill>
+                <a:uFill>
+                  <a:solidFill>
+                    <a:srgbClr val="FFFFFF"/>
+                  </a:solidFill>
+                </a:uFill>
+                <a:latin typeface="Arial" panose="020B0604020202020204"/>
+                <a:ea typeface="DejaVu Sans"/>
+              </a:rPr>
+              <a:t> reg</a:t>
             </a:r>
             <a:endParaRPr lang="zh-CN" altLang="en-US" dirty="0"/>
           </a:p>
@@ -22102,63 +22297,69 @@
             </a:r>
             <a:r>
               <a:rPr lang="en-US" altLang="zh-CN" sz="2400" dirty="0"/>
-              <a:t> 0xBK 0xPG &gt; </a:t>
-            </a:r>
-            <a:r>
-              <a:rPr lang="en-US" altLang="zh-CN" sz="2400" dirty="0" err="1"/>
-              <a:t>regdump</a:t>
-            </a:r>
-            <a:endParaRPr lang="en-US" altLang="zh-CN" sz="2400" dirty="0"/>
+              <a:t> 0xBK 0xPG 0xRG 0xXX &gt; reg</a:t>
+            </a:r>
           </a:p>
           <a:p>
             <a:pPr marL="454846" lvl="1" indent="0">
               <a:buNone/>
             </a:pPr>
             <a:r>
-              <a:rPr lang="en-US" altLang="zh-CN" sz="2000" dirty="0"/>
-              <a:t>Illustration: the command dump all the registers of the specific page</a:t>
+              <a:rPr lang="en-US" altLang="zh-CN" sz="1600" dirty="0"/>
+              <a:t>Illustration: Write a value to a certain register</a:t>
             </a:r>
           </a:p>
           <a:p>
             <a:pPr lvl="1"/>
             <a:r>
-              <a:rPr lang="en-US" altLang="zh-CN" dirty="0" err="1"/>
+              <a:rPr lang="en-US" altLang="zh-CN" sz="1600" dirty="0" err="1"/>
               <a:t>chn</a:t>
             </a:r>
             <a:r>
-              <a:rPr lang="en-US" altLang="zh-CN" dirty="0"/>
+              <a:rPr lang="en-US" altLang="zh-CN" sz="1600" dirty="0"/>
               <a:t> is channel no, must be 1-digital</a:t>
             </a:r>
           </a:p>
           <a:p>
             <a:pPr lvl="1"/>
             <a:r>
-              <a:rPr lang="en-US" altLang="zh-CN" dirty="0"/>
-              <a:t>BK &amp; PG must be 2-digital HEX</a:t>
+              <a:rPr lang="en-US" altLang="zh-CN" sz="1600" dirty="0"/>
+              <a:t>BK, PG, RG &amp; XX must be 2-digital HEX</a:t>
+            </a:r>
+          </a:p>
+          <a:p>
+            <a:pPr lvl="1"/>
+            <a:r>
+              <a:rPr lang="en-US" altLang="zh-CN" sz="1600" dirty="0" err="1"/>
+              <a:t>eg</a:t>
+            </a:r>
+            <a:r>
+              <a:rPr lang="en-US" altLang="zh-CN" sz="1600" dirty="0"/>
+              <a:t>: 0 0x00 </a:t>
+            </a:r>
+            <a:r>
+              <a:rPr lang="en-US" altLang="zh-CN" sz="1600" dirty="0" err="1"/>
+              <a:t>0x00</a:t>
+            </a:r>
+            <a:r>
+              <a:rPr lang="en-US" altLang="zh-CN" sz="1600" dirty="0"/>
+              <a:t> 0x05 0x07 &gt; reg</a:t>
             </a:r>
           </a:p>
           <a:p>
             <a:r>
               <a:rPr lang="en-US" altLang="zh-CN" sz="2400" dirty="0"/>
-              <a:t>#cat </a:t>
-            </a:r>
-            <a:r>
-              <a:rPr lang="en-US" altLang="zh-CN" sz="2400" dirty="0" err="1"/>
-              <a:t>regdump</a:t>
-            </a:r>
-            <a:endParaRPr lang="en-US" altLang="zh-CN" sz="2400" dirty="0"/>
+              <a:t>#cat reg</a:t>
+            </a:r>
           </a:p>
           <a:p>
             <a:pPr marL="454846" lvl="1" indent="0">
               <a:buNone/>
             </a:pPr>
             <a:r>
-              <a:rPr lang="en-US" altLang="zh-CN" sz="2000" dirty="0"/>
-              <a:t>Illustration: run the echo command, show the 7-bit i2c address of the chip and dump the registers</a:t>
-            </a:r>
-          </a:p>
-          <a:p>
-            <a:endParaRPr lang="en-US" altLang="zh-CN" sz="2000" dirty="0"/>
+              <a:rPr lang="en-US" altLang="zh-CN" sz="1600" dirty="0"/>
+              <a:t>Illustration: Read back the value from the register which have been echoed before</a:t>
+            </a:r>
           </a:p>
         </p:txBody>
       </p:sp>
@@ -22196,6 +22397,244 @@
                 <a:defRPr/>
               </a:pPr>
               <a:t>20</a:t>
+            </a:fld>
+            <a:endParaRPr lang="en-US" dirty="0">
+              <a:solidFill>
+                <a:srgbClr val="000000"/>
+              </a:solidFill>
+            </a:endParaRPr>
+          </a:p>
+        </p:txBody>
+      </p:sp>
+      <p:pic>
+        <p:nvPicPr>
+          <p:cNvPr id="2" name="图片 1">
+            <a:extLst>
+              <a:ext uri="{FF2B5EF4-FFF2-40B4-BE49-F238E27FC236}">
+                <a16:creationId xmlns:a16="http://schemas.microsoft.com/office/drawing/2014/main" id="{07F66BED-2FB2-FD3C-6EEB-23DD2175CE4C}"/>
+              </a:ext>
+            </a:extLst>
+          </p:cNvPr>
+          <p:cNvPicPr>
+            <a:picLocks noChangeAspect="1"/>
+          </p:cNvPicPr>
+          <p:nvPr/>
+        </p:nvPicPr>
+        <p:blipFill>
+          <a:blip r:embed="rId2"/>
+          <a:stretch>
+            <a:fillRect/>
+          </a:stretch>
+        </p:blipFill>
+        <p:spPr>
+          <a:xfrm>
+            <a:off x="892419" y="3585429"/>
+            <a:ext cx="8172450" cy="824859"/>
+          </a:xfrm>
+          <a:prstGeom prst="rect">
+            <a:avLst/>
+          </a:prstGeom>
+        </p:spPr>
+      </p:pic>
+    </p:spTree>
+    <p:extLst>
+      <p:ext uri="{BB962C8B-B14F-4D97-AF65-F5344CB8AC3E}">
+        <p14:creationId xmlns:p14="http://schemas.microsoft.com/office/powerpoint/2010/main" val="864682733"/>
+      </p:ext>
+    </p:extLst>
+  </p:cSld>
+  <p:clrMapOvr>
+    <a:masterClrMapping/>
+  </p:clrMapOvr>
+</p:sld>
+</file>
+
+<file path=ppt/slides/slide21.xml><?xml version="1.0" encoding="utf-8"?>
+<p:sld xmlns:a="http://schemas.openxmlformats.org/drawingml/2006/main" xmlns:r="http://schemas.openxmlformats.org/officeDocument/2006/relationships" xmlns:p="http://schemas.openxmlformats.org/presentationml/2006/main">
+  <p:cSld>
+    <p:spTree>
+      <p:nvGrpSpPr>
+        <p:cNvPr id="1" name=""/>
+        <p:cNvGrpSpPr/>
+        <p:nvPr/>
+      </p:nvGrpSpPr>
+      <p:grpSpPr>
+        <a:xfrm>
+          <a:off x="0" y="0"/>
+          <a:ext cx="0" cy="0"/>
+          <a:chOff x="0" y="0"/>
+          <a:chExt cx="0" cy="0"/>
+        </a:xfrm>
+      </p:grpSpPr>
+      <p:sp>
+        <p:nvSpPr>
+          <p:cNvPr id="6" name="标题 5">
+            <a:extLst>
+              <a:ext uri="{FF2B5EF4-FFF2-40B4-BE49-F238E27FC236}">
+                <a16:creationId xmlns:a16="http://schemas.microsoft.com/office/drawing/2014/main" id="{D6F6AC84-A378-485C-A3D5-469F0AB06CF2}"/>
+              </a:ext>
+            </a:extLst>
+          </p:cNvPr>
+          <p:cNvSpPr>
+            <a:spLocks noGrp="1"/>
+          </p:cNvSpPr>
+          <p:nvPr>
+            <p:ph type="title"/>
+          </p:nvPr>
+        </p:nvSpPr>
+        <p:spPr/>
+        <p:txBody>
+          <a:bodyPr/>
+          <a:lstStyle/>
+          <a:p>
+            <a:r>
+              <a:rPr lang="en-US" altLang="zh-CN" sz="3600" b="1" strike="noStrike" spc="-1" dirty="0">
+                <a:solidFill>
+                  <a:srgbClr val="DE0000"/>
+                </a:solidFill>
+                <a:uFill>
+                  <a:solidFill>
+                    <a:srgbClr val="FFFFFF"/>
+                  </a:solidFill>
+                </a:uFill>
+                <a:latin typeface="Arial" panose="020B0604020202020204"/>
+                <a:ea typeface="DejaVu Sans"/>
+              </a:rPr>
+              <a:t>Driver nodes III | </a:t>
+            </a:r>
+            <a:r>
+              <a:rPr lang="en-US" altLang="zh-CN" sz="3600" dirty="0" err="1"/>
+              <a:t>regdump</a:t>
+            </a:r>
+            <a:endParaRPr lang="zh-CN" altLang="en-US" dirty="0"/>
+          </a:p>
+        </p:txBody>
+      </p:sp>
+      <p:sp>
+        <p:nvSpPr>
+          <p:cNvPr id="7" name="内容占位符 6">
+            <a:extLst>
+              <a:ext uri="{FF2B5EF4-FFF2-40B4-BE49-F238E27FC236}">
+                <a16:creationId xmlns:a16="http://schemas.microsoft.com/office/drawing/2014/main" id="{88EE38F9-0269-4DD7-B0FE-B771F2A3C2A9}"/>
+              </a:ext>
+            </a:extLst>
+          </p:cNvPr>
+          <p:cNvSpPr>
+            <a:spLocks noGrp="1"/>
+          </p:cNvSpPr>
+          <p:nvPr>
+            <p:ph idx="1"/>
+          </p:nvPr>
+        </p:nvSpPr>
+        <p:spPr/>
+        <p:txBody>
+          <a:bodyPr/>
+          <a:lstStyle/>
+          <a:p>
+            <a:r>
+              <a:rPr lang="en-US" altLang="zh-CN" sz="2400" dirty="0"/>
+              <a:t>#echo </a:t>
+            </a:r>
+            <a:r>
+              <a:rPr lang="en-US" altLang="zh-CN" sz="2400" dirty="0" err="1"/>
+              <a:t>chn</a:t>
+            </a:r>
+            <a:r>
+              <a:rPr lang="en-US" altLang="zh-CN" sz="2400" dirty="0"/>
+              <a:t> 0xBK 0xPG &gt; </a:t>
+            </a:r>
+            <a:r>
+              <a:rPr lang="en-US" altLang="zh-CN" sz="2400" dirty="0" err="1"/>
+              <a:t>regdump</a:t>
+            </a:r>
+            <a:endParaRPr lang="en-US" altLang="zh-CN" sz="2400" dirty="0"/>
+          </a:p>
+          <a:p>
+            <a:pPr marL="454846" lvl="1" indent="0">
+              <a:buNone/>
+            </a:pPr>
+            <a:r>
+              <a:rPr lang="en-US" altLang="zh-CN" sz="2000" dirty="0"/>
+              <a:t>Illustration: the command dump all the registers of the specific page</a:t>
+            </a:r>
+          </a:p>
+          <a:p>
+            <a:pPr lvl="1"/>
+            <a:r>
+              <a:rPr lang="en-US" altLang="zh-CN" dirty="0" err="1"/>
+              <a:t>chn</a:t>
+            </a:r>
+            <a:r>
+              <a:rPr lang="en-US" altLang="zh-CN" dirty="0"/>
+              <a:t> is channel no, must be 1-digital</a:t>
+            </a:r>
+          </a:p>
+          <a:p>
+            <a:pPr lvl="1"/>
+            <a:r>
+              <a:rPr lang="en-US" altLang="zh-CN" dirty="0"/>
+              <a:t>BK &amp; PG must be 2-digital HEX</a:t>
+            </a:r>
+          </a:p>
+          <a:p>
+            <a:r>
+              <a:rPr lang="en-US" altLang="zh-CN" sz="2400" dirty="0"/>
+              <a:t>#cat </a:t>
+            </a:r>
+            <a:r>
+              <a:rPr lang="en-US" altLang="zh-CN" sz="2400" dirty="0" err="1"/>
+              <a:t>regdump</a:t>
+            </a:r>
+            <a:endParaRPr lang="en-US" altLang="zh-CN" sz="2400" dirty="0"/>
+          </a:p>
+          <a:p>
+            <a:pPr marL="454846" lvl="1" indent="0">
+              <a:buNone/>
+            </a:pPr>
+            <a:r>
+              <a:rPr lang="en-US" altLang="zh-CN" sz="2000" dirty="0"/>
+              <a:t>Illustration: run the echo command, show the 7-bit i2c address of the chip and dump the registers</a:t>
+            </a:r>
+          </a:p>
+          <a:p>
+            <a:endParaRPr lang="en-US" altLang="zh-CN" sz="2000" dirty="0"/>
+          </a:p>
+        </p:txBody>
+      </p:sp>
+      <p:sp>
+        <p:nvSpPr>
+          <p:cNvPr id="5" name="灯片编号占位符 4">
+            <a:extLst>
+              <a:ext uri="{FF2B5EF4-FFF2-40B4-BE49-F238E27FC236}">
+                <a16:creationId xmlns:a16="http://schemas.microsoft.com/office/drawing/2014/main" id="{A0EB225E-7E2D-49AB-9C04-CAB0FF989B61}"/>
+              </a:ext>
+            </a:extLst>
+          </p:cNvPr>
+          <p:cNvSpPr>
+            <a:spLocks noGrp="1"/>
+          </p:cNvSpPr>
+          <p:nvPr>
+            <p:ph type="sldNum" sz="quarter" idx="10"/>
+          </p:nvPr>
+        </p:nvSpPr>
+        <p:spPr/>
+        <p:txBody>
+          <a:bodyPr/>
+          <a:lstStyle/>
+          <a:p>
+            <a:pPr>
+              <a:defRPr/>
+            </a:pPr>
+            <a:fld id="{B53548F6-AAA9-4A8D-A869-511B3DFE3256}" type="slidenum">
+              <a:rPr lang="en-US" smtClean="0">
+                <a:solidFill>
+                  <a:srgbClr val="000000"/>
+                </a:solidFill>
+              </a:rPr>
+              <a:pPr>
+                <a:defRPr/>
+              </a:pPr>
+              <a:t>21</a:t>
             </a:fld>
             <a:endParaRPr lang="en-US" dirty="0">
               <a:solidFill>
@@ -22233,7 +22672,7 @@
           <a:graphicData uri="http://schemas.openxmlformats.org/presentationml/2006/ole">
             <mc:AlternateContent xmlns:mc="http://schemas.openxmlformats.org/markup-compatibility/2006">
               <mc:Choice xmlns:v="urn:schemas-microsoft-com:vml" Requires="v">
-                <p:oleObj spid="_x0000_s3076" name="包装程序外壳对象" showAsIcon="1" r:id="rId3" imgW="731520" imgH="663058" progId="Package">
+                <p:oleObj spid="_x0000_s3094" name="包装程序外壳对象" showAsIcon="1" r:id="rId3" imgW="731520" imgH="663058" progId="Package">
                   <p:embed/>
                 </p:oleObj>
               </mc:Choice>
@@ -22302,7 +22741,7 @@
           <a:graphicData uri="http://schemas.openxmlformats.org/presentationml/2006/ole">
             <mc:AlternateContent xmlns:mc="http://schemas.openxmlformats.org/markup-compatibility/2006">
               <mc:Choice xmlns:v="urn:schemas-microsoft-com:vml" Requires="v">
-                <p:oleObj spid="_x0000_s3077" name="包装程序外壳对象" showAsIcon="1" r:id="rId5" imgW="619200" imgH="559800" progId="Package">
+                <p:oleObj spid="_x0000_s3095" name="包装程序外壳对象" showAsIcon="1" r:id="rId5" imgW="619200" imgH="559800" progId="Package">
                   <p:embed/>
                 </p:oleObj>
               </mc:Choice>
@@ -22356,7 +22795,7 @@
 </p:sld>
 </file>
 
-<file path=ppt/slides/slide21.xml><?xml version="1.0" encoding="utf-8"?>
+<file path=ppt/slides/slide22.xml><?xml version="1.0" encoding="utf-8"?>
 <p:sld xmlns:a="http://schemas.openxmlformats.org/drawingml/2006/main" xmlns:r="http://schemas.openxmlformats.org/officeDocument/2006/relationships" xmlns:p="http://schemas.openxmlformats.org/presentationml/2006/main">
   <p:cSld>
     <p:spTree>
@@ -22571,7 +23010,7 @@
               <a:pPr>
                 <a:defRPr/>
               </a:pPr>
-              <a:t>21</a:t>
+              <a:t>22</a:t>
             </a:fld>
             <a:endParaRPr lang="en-US" dirty="0">
               <a:solidFill>
@@ -22654,7 +23093,7 @@
 </p:sld>
 </file>
 
-<file path=ppt/slides/slide22.xml><?xml version="1.0" encoding="utf-8"?>
+<file path=ppt/slides/slide23.xml><?xml version="1.0" encoding="utf-8"?>
 <p:sld xmlns:a="http://schemas.openxmlformats.org/drawingml/2006/main" xmlns:r="http://schemas.openxmlformats.org/officeDocument/2006/relationships" xmlns:p="http://schemas.openxmlformats.org/presentationml/2006/main">
   <p:cSld>
     <p:spTree>
@@ -22826,7 +23265,7 @@
               <a:pPr>
                 <a:defRPr/>
               </a:pPr>
-              <a:t>22</a:t>
+              <a:t>23</a:t>
             </a:fld>
             <a:endParaRPr lang="en-US" dirty="0">
               <a:solidFill>
@@ -22881,7 +23320,7 @@
 </p:sld>
 </file>
 
-<file path=ppt/slides/slide23.xml><?xml version="1.0" encoding="utf-8"?>
+<file path=ppt/slides/slide24.xml><?xml version="1.0" encoding="utf-8"?>
 <p:sld xmlns:a="http://schemas.openxmlformats.org/drawingml/2006/main" xmlns:r="http://schemas.openxmlformats.org/officeDocument/2006/relationships" xmlns:p="http://schemas.openxmlformats.org/presentationml/2006/main">
   <p:cSld>
     <p:spTree>
@@ -23040,7 +23479,7 @@
                 </a:spcAft>
                 <a:defRPr/>
               </a:pPr>
-              <a:t>23</a:t>
+              <a:t>24</a:t>
             </a:fld>
             <a:endParaRPr lang="en-US">
               <a:solidFill>
@@ -24013,7 +24452,7 @@
 </p:sld>
 </file>
 
-<file path=ppt/slides/slide24.xml><?xml version="1.0" encoding="utf-8"?>
+<file path=ppt/slides/slide25.xml><?xml version="1.0" encoding="utf-8"?>
 <p:sld xmlns:a="http://schemas.openxmlformats.org/drawingml/2006/main" xmlns:r="http://schemas.openxmlformats.org/officeDocument/2006/relationships" xmlns:p="http://schemas.openxmlformats.org/presentationml/2006/main">
   <p:cSld>
     <p:spTree>
@@ -24199,7 +24638,7 @@
                 </a:spcAft>
                 <a:defRPr/>
               </a:pPr>
-              <a:t>24</a:t>
+              <a:t>25</a:t>
             </a:fld>
             <a:endParaRPr lang="en-US">
               <a:solidFill>
@@ -25172,7 +25611,7 @@
 </p:sld>
 </file>
 
-<file path=ppt/slides/slide25.xml><?xml version="1.0" encoding="utf-8"?>
+<file path=ppt/slides/slide26.xml><?xml version="1.0" encoding="utf-8"?>
 <p:sld xmlns:a="http://schemas.openxmlformats.org/drawingml/2006/main" xmlns:r="http://schemas.openxmlformats.org/officeDocument/2006/relationships" xmlns:p="http://schemas.openxmlformats.org/presentationml/2006/main">
   <p:cSld>
     <p:spTree>
@@ -25376,7 +25815,7 @@
                 </a:spcAft>
                 <a:defRPr/>
               </a:pPr>
-              <a:t>25</a:t>
+              <a:t>26</a:t>
             </a:fld>
             <a:endParaRPr lang="en-US">
               <a:solidFill>
@@ -25399,7 +25838,7 @@
 </p:sld>
 </file>
 
-<file path=ppt/slides/slide26.xml><?xml version="1.0" encoding="utf-8"?>
+<file path=ppt/slides/slide27.xml><?xml version="1.0" encoding="utf-8"?>
 <p:sld xmlns:a="http://schemas.openxmlformats.org/drawingml/2006/main" xmlns:r="http://schemas.openxmlformats.org/officeDocument/2006/relationships" xmlns:p="http://schemas.openxmlformats.org/presentationml/2006/main">
   <p:cSld>
     <p:spTree>
@@ -25589,7 +26028,7 @@
                 </a:spcAft>
                 <a:defRPr/>
               </a:pPr>
-              <a:t>26</a:t>
+              <a:t>27</a:t>
             </a:fld>
             <a:endParaRPr lang="en-US">
               <a:solidFill>
@@ -25642,7 +26081,7 @@
 </p:sld>
 </file>
 
-<file path=ppt/slides/slide27.xml><?xml version="1.0" encoding="utf-8"?>
+<file path=ppt/slides/slide28.xml><?xml version="1.0" encoding="utf-8"?>
 <p:sld xmlns:a="http://schemas.openxmlformats.org/drawingml/2006/main" xmlns:r="http://schemas.openxmlformats.org/officeDocument/2006/relationships" xmlns:p="http://schemas.openxmlformats.org/presentationml/2006/main">
   <p:cSld>
     <p:spTree>
@@ -25802,7 +26241,7 @@
                 </a:spcAft>
                 <a:defRPr/>
               </a:pPr>
-              <a:t>27</a:t>
+              <a:t>28</a:t>
             </a:fld>
             <a:endParaRPr lang="en-US">
               <a:solidFill>
@@ -26467,7 +26906,7 @@
 </p:sld>
 </file>
 
-<file path=ppt/slides/slide28.xml><?xml version="1.0" encoding="utf-8"?>
+<file path=ppt/slides/slide29.xml><?xml version="1.0" encoding="utf-8"?>
 <p:sld xmlns:a="http://schemas.openxmlformats.org/drawingml/2006/main" xmlns:r="http://schemas.openxmlformats.org/officeDocument/2006/relationships" xmlns:p="http://schemas.openxmlformats.org/presentationml/2006/main">
   <p:cSld>
     <p:spTree>
@@ -26534,179 +26973,6 @@
               <a:pPr>
                 <a:defRPr/>
               </a:pPr>
-              <a:t>28</a:t>
-            </a:fld>
-            <a:endParaRPr lang="en-US">
-              <a:solidFill>
-                <a:srgbClr val="000000"/>
-              </a:solidFill>
-            </a:endParaRPr>
-          </a:p>
-        </p:txBody>
-      </p:sp>
-    </p:spTree>
-    <p:extLst>
-      <p:ext uri="{BB962C8B-B14F-4D97-AF65-F5344CB8AC3E}">
-        <p14:creationId xmlns:p14="http://schemas.microsoft.com/office/powerpoint/2010/main" val="2041980710"/>
-      </p:ext>
-    </p:extLst>
-  </p:cSld>
-  <p:clrMapOvr>
-    <a:masterClrMapping/>
-  </p:clrMapOvr>
-</p:sld>
-</file>
-
-<file path=ppt/slides/slide29.xml><?xml version="1.0" encoding="utf-8"?>
-<p:sld xmlns:a="http://schemas.openxmlformats.org/drawingml/2006/main" xmlns:r="http://schemas.openxmlformats.org/officeDocument/2006/relationships" xmlns:p="http://schemas.openxmlformats.org/presentationml/2006/main">
-  <p:cSld>
-    <p:spTree>
-      <p:nvGrpSpPr>
-        <p:cNvPr id="1" name=""/>
-        <p:cNvGrpSpPr/>
-        <p:nvPr/>
-      </p:nvGrpSpPr>
-      <p:grpSpPr>
-        <a:xfrm>
-          <a:off x="0" y="0"/>
-          <a:ext cx="0" cy="0"/>
-          <a:chOff x="0" y="0"/>
-          <a:chExt cx="0" cy="0"/>
-        </a:xfrm>
-      </p:grpSpPr>
-      <p:sp>
-        <p:nvSpPr>
-          <p:cNvPr id="2" name="标题 1">
-            <a:extLst>
-              <a:ext uri="{FF2B5EF4-FFF2-40B4-BE49-F238E27FC236}">
-                <a16:creationId xmlns:a16="http://schemas.microsoft.com/office/drawing/2014/main" id="{2630E4F2-8874-8736-4C95-A55AD45D5CC7}"/>
-              </a:ext>
-            </a:extLst>
-          </p:cNvPr>
-          <p:cNvSpPr>
-            <a:spLocks noGrp="1"/>
-          </p:cNvSpPr>
-          <p:nvPr>
-            <p:ph type="title"/>
-          </p:nvPr>
-        </p:nvSpPr>
-        <p:spPr/>
-        <p:txBody>
-          <a:bodyPr/>
-          <a:lstStyle/>
-          <a:p>
-            <a:r>
-              <a:rPr lang="en-US" altLang="zh-CN" dirty="0"/>
-              <a:t>Kernel 5.10-rt</a:t>
-            </a:r>
-            <a:endParaRPr lang="zh-CN" altLang="en-US" dirty="0"/>
-          </a:p>
-        </p:txBody>
-      </p:sp>
-      <p:sp>
-        <p:nvSpPr>
-          <p:cNvPr id="3" name="内容占位符 2">
-            <a:extLst>
-              <a:ext uri="{FF2B5EF4-FFF2-40B4-BE49-F238E27FC236}">
-                <a16:creationId xmlns:a16="http://schemas.microsoft.com/office/drawing/2014/main" id="{A95A92B7-BB54-6336-64C5-1B9CAB8CF687}"/>
-              </a:ext>
-            </a:extLst>
-          </p:cNvPr>
-          <p:cNvSpPr>
-            <a:spLocks noGrp="1"/>
-          </p:cNvSpPr>
-          <p:nvPr>
-            <p:ph idx="1"/>
-          </p:nvPr>
-        </p:nvSpPr>
-        <p:spPr/>
-        <p:txBody>
-          <a:bodyPr/>
-          <a:lstStyle/>
-          <a:p>
-            <a:r>
-              <a:rPr lang="en-US" altLang="zh-CN" dirty="0"/>
-              <a:t>Download Kernel 5.10-rt for BBB from…</a:t>
-            </a:r>
-            <a:endParaRPr lang="zh-CN" altLang="en-US" dirty="0"/>
-          </a:p>
-          <a:p>
-            <a:pPr lvl="1"/>
-            <a:r>
-              <a:rPr lang="en-US" altLang="zh-CN" dirty="0">
-                <a:hlinkClick r:id="rId2"/>
-              </a:rPr>
-              <a:t>https://github.com/beagleboard/linux/tree/5.10-rt</a:t>
-            </a:r>
-            <a:endParaRPr lang="en-US" altLang="zh-CN" dirty="0"/>
-          </a:p>
-          <a:p>
-            <a:r>
-              <a:rPr lang="en-US" altLang="zh-CN" dirty="0"/>
-              <a:t># </a:t>
-            </a:r>
-            <a:r>
-              <a:rPr lang="en-US" altLang="zh-CN" dirty="0" err="1"/>
-              <a:t>sudo</a:t>
-            </a:r>
-            <a:r>
-              <a:rPr lang="en-US" altLang="zh-CN" dirty="0"/>
-              <a:t> unzip kernel-5.10-rt</a:t>
-            </a:r>
-          </a:p>
-          <a:p>
-            <a:pPr marL="0" indent="0">
-              <a:buNone/>
-            </a:pPr>
-            <a:endParaRPr lang="zh-CN" altLang="en-US" dirty="0"/>
-          </a:p>
-        </p:txBody>
-      </p:sp>
-      <p:sp>
-        <p:nvSpPr>
-          <p:cNvPr id="4" name="灯片编号占位符 3">
-            <a:extLst>
-              <a:ext uri="{FF2B5EF4-FFF2-40B4-BE49-F238E27FC236}">
-                <a16:creationId xmlns:a16="http://schemas.microsoft.com/office/drawing/2014/main" id="{62BBA5B9-C291-D9F1-8121-14463A6C5005}"/>
-              </a:ext>
-            </a:extLst>
-          </p:cNvPr>
-          <p:cNvSpPr>
-            <a:spLocks noGrp="1"/>
-          </p:cNvSpPr>
-          <p:nvPr>
-            <p:ph type="sldNum" sz="quarter" idx="10"/>
-          </p:nvPr>
-        </p:nvSpPr>
-        <p:spPr/>
-        <p:txBody>
-          <a:bodyPr/>
-          <a:lstStyle/>
-          <a:p>
-            <a:pPr defTabSz="1219170" fontAlgn="base">
-              <a:spcBef>
-                <a:spcPct val="0"/>
-              </a:spcBef>
-              <a:spcAft>
-                <a:spcPct val="0"/>
-              </a:spcAft>
-              <a:defRPr/>
-            </a:pPr>
-            <a:fld id="{2B97888F-6AF7-4263-B69D-592D8C33BAC7}" type="slidenum">
-              <a:rPr lang="en-US" smtClean="0">
-                <a:solidFill>
-                  <a:srgbClr val="000000"/>
-                </a:solidFill>
-              </a:rPr>
-              <a:pPr defTabSz="1219170" fontAlgn="base">
-                <a:spcBef>
-                  <a:spcPct val="0"/>
-                </a:spcBef>
-                <a:spcAft>
-                  <a:spcPct val="0"/>
-                </a:spcAft>
-                <a:defRPr/>
-              </a:pPr>
               <a:t>29</a:t>
             </a:fld>
             <a:endParaRPr lang="en-US">
@@ -26720,7 +26986,7 @@
     </p:spTree>
     <p:extLst>
       <p:ext uri="{BB962C8B-B14F-4D97-AF65-F5344CB8AC3E}">
-        <p14:creationId xmlns:p14="http://schemas.microsoft.com/office/powerpoint/2010/main" val="510109635"/>
+        <p14:creationId xmlns:p14="http://schemas.microsoft.com/office/powerpoint/2010/main" val="2041980710"/>
       </p:ext>
     </p:extLst>
   </p:cSld>
@@ -27220,6 +27486,179 @@
           <p:cNvPr id="2" name="标题 1">
             <a:extLst>
               <a:ext uri="{FF2B5EF4-FFF2-40B4-BE49-F238E27FC236}">
+                <a16:creationId xmlns:a16="http://schemas.microsoft.com/office/drawing/2014/main" id="{2630E4F2-8874-8736-4C95-A55AD45D5CC7}"/>
+              </a:ext>
+            </a:extLst>
+          </p:cNvPr>
+          <p:cNvSpPr>
+            <a:spLocks noGrp="1"/>
+          </p:cNvSpPr>
+          <p:nvPr>
+            <p:ph type="title"/>
+          </p:nvPr>
+        </p:nvSpPr>
+        <p:spPr/>
+        <p:txBody>
+          <a:bodyPr/>
+          <a:lstStyle/>
+          <a:p>
+            <a:r>
+              <a:rPr lang="en-US" altLang="zh-CN" dirty="0"/>
+              <a:t>Kernel 5.10-rt</a:t>
+            </a:r>
+            <a:endParaRPr lang="zh-CN" altLang="en-US" dirty="0"/>
+          </a:p>
+        </p:txBody>
+      </p:sp>
+      <p:sp>
+        <p:nvSpPr>
+          <p:cNvPr id="3" name="内容占位符 2">
+            <a:extLst>
+              <a:ext uri="{FF2B5EF4-FFF2-40B4-BE49-F238E27FC236}">
+                <a16:creationId xmlns:a16="http://schemas.microsoft.com/office/drawing/2014/main" id="{A95A92B7-BB54-6336-64C5-1B9CAB8CF687}"/>
+              </a:ext>
+            </a:extLst>
+          </p:cNvPr>
+          <p:cNvSpPr>
+            <a:spLocks noGrp="1"/>
+          </p:cNvSpPr>
+          <p:nvPr>
+            <p:ph idx="1"/>
+          </p:nvPr>
+        </p:nvSpPr>
+        <p:spPr/>
+        <p:txBody>
+          <a:bodyPr/>
+          <a:lstStyle/>
+          <a:p>
+            <a:r>
+              <a:rPr lang="en-US" altLang="zh-CN" dirty="0"/>
+              <a:t>Download Kernel 5.10-rt for BBB from…</a:t>
+            </a:r>
+            <a:endParaRPr lang="zh-CN" altLang="en-US" dirty="0"/>
+          </a:p>
+          <a:p>
+            <a:pPr lvl="1"/>
+            <a:r>
+              <a:rPr lang="en-US" altLang="zh-CN" dirty="0">
+                <a:hlinkClick r:id="rId2"/>
+              </a:rPr>
+              <a:t>https://github.com/beagleboard/linux/tree/5.10-rt</a:t>
+            </a:r>
+            <a:endParaRPr lang="en-US" altLang="zh-CN" dirty="0"/>
+          </a:p>
+          <a:p>
+            <a:r>
+              <a:rPr lang="en-US" altLang="zh-CN" dirty="0"/>
+              <a:t># </a:t>
+            </a:r>
+            <a:r>
+              <a:rPr lang="en-US" altLang="zh-CN" dirty="0" err="1"/>
+              <a:t>sudo</a:t>
+            </a:r>
+            <a:r>
+              <a:rPr lang="en-US" altLang="zh-CN" dirty="0"/>
+              <a:t> unzip kernel-5.10-rt</a:t>
+            </a:r>
+          </a:p>
+          <a:p>
+            <a:pPr marL="0" indent="0">
+              <a:buNone/>
+            </a:pPr>
+            <a:endParaRPr lang="zh-CN" altLang="en-US" dirty="0"/>
+          </a:p>
+        </p:txBody>
+      </p:sp>
+      <p:sp>
+        <p:nvSpPr>
+          <p:cNvPr id="4" name="灯片编号占位符 3">
+            <a:extLst>
+              <a:ext uri="{FF2B5EF4-FFF2-40B4-BE49-F238E27FC236}">
+                <a16:creationId xmlns:a16="http://schemas.microsoft.com/office/drawing/2014/main" id="{62BBA5B9-C291-D9F1-8121-14463A6C5005}"/>
+              </a:ext>
+            </a:extLst>
+          </p:cNvPr>
+          <p:cNvSpPr>
+            <a:spLocks noGrp="1"/>
+          </p:cNvSpPr>
+          <p:nvPr>
+            <p:ph type="sldNum" sz="quarter" idx="10"/>
+          </p:nvPr>
+        </p:nvSpPr>
+        <p:spPr/>
+        <p:txBody>
+          <a:bodyPr/>
+          <a:lstStyle/>
+          <a:p>
+            <a:pPr defTabSz="1219170" fontAlgn="base">
+              <a:spcBef>
+                <a:spcPct val="0"/>
+              </a:spcBef>
+              <a:spcAft>
+                <a:spcPct val="0"/>
+              </a:spcAft>
+              <a:defRPr/>
+            </a:pPr>
+            <a:fld id="{2B97888F-6AF7-4263-B69D-592D8C33BAC7}" type="slidenum">
+              <a:rPr lang="en-US" smtClean="0">
+                <a:solidFill>
+                  <a:srgbClr val="000000"/>
+                </a:solidFill>
+              </a:rPr>
+              <a:pPr defTabSz="1219170" fontAlgn="base">
+                <a:spcBef>
+                  <a:spcPct val="0"/>
+                </a:spcBef>
+                <a:spcAft>
+                  <a:spcPct val="0"/>
+                </a:spcAft>
+                <a:defRPr/>
+              </a:pPr>
+              <a:t>30</a:t>
+            </a:fld>
+            <a:endParaRPr lang="en-US">
+              <a:solidFill>
+                <a:srgbClr val="000000"/>
+              </a:solidFill>
+            </a:endParaRPr>
+          </a:p>
+        </p:txBody>
+      </p:sp>
+    </p:spTree>
+    <p:extLst>
+      <p:ext uri="{BB962C8B-B14F-4D97-AF65-F5344CB8AC3E}">
+        <p14:creationId xmlns:p14="http://schemas.microsoft.com/office/powerpoint/2010/main" val="510109635"/>
+      </p:ext>
+    </p:extLst>
+  </p:cSld>
+  <p:clrMapOvr>
+    <a:masterClrMapping/>
+  </p:clrMapOvr>
+</p:sld>
+</file>
+
+<file path=ppt/slides/slide31.xml><?xml version="1.0" encoding="utf-8"?>
+<p:sld xmlns:a="http://schemas.openxmlformats.org/drawingml/2006/main" xmlns:r="http://schemas.openxmlformats.org/officeDocument/2006/relationships" xmlns:p="http://schemas.openxmlformats.org/presentationml/2006/main">
+  <p:cSld>
+    <p:spTree>
+      <p:nvGrpSpPr>
+        <p:cNvPr id="1" name=""/>
+        <p:cNvGrpSpPr/>
+        <p:nvPr/>
+      </p:nvGrpSpPr>
+      <p:grpSpPr>
+        <a:xfrm>
+          <a:off x="0" y="0"/>
+          <a:ext cx="0" cy="0"/>
+          <a:chOff x="0" y="0"/>
+          <a:chExt cx="0" cy="0"/>
+        </a:xfrm>
+      </p:grpSpPr>
+      <p:sp>
+        <p:nvSpPr>
+          <p:cNvPr id="2" name="标题 1">
+            <a:extLst>
+              <a:ext uri="{FF2B5EF4-FFF2-40B4-BE49-F238E27FC236}">
                 <a16:creationId xmlns:a16="http://schemas.microsoft.com/office/drawing/2014/main" id="{6400713A-C30C-71CF-C0DC-7EB1BBCB4A73}"/>
               </a:ext>
             </a:extLst>
@@ -27486,7 +27925,7 @@
                 </a:spcAft>
                 <a:defRPr/>
               </a:pPr>
-              <a:t>30</a:t>
+              <a:t>31</a:t>
             </a:fld>
             <a:endParaRPr lang="en-US">
               <a:solidFill>
@@ -27509,7 +27948,7 @@
 </p:sld>
 </file>
 
-<file path=ppt/slides/slide31.xml><?xml version="1.0" encoding="utf-8"?>
+<file path=ppt/slides/slide32.xml><?xml version="1.0" encoding="utf-8"?>
 <p:sld xmlns:a="http://schemas.openxmlformats.org/drawingml/2006/main" xmlns:r="http://schemas.openxmlformats.org/officeDocument/2006/relationships" xmlns:p="http://schemas.openxmlformats.org/presentationml/2006/main">
   <p:cSld>
     <p:spTree>
@@ -27939,7 +28378,7 @@
                 </a:spcAft>
                 <a:defRPr/>
               </a:pPr>
-              <a:t>31</a:t>
+              <a:t>32</a:t>
             </a:fld>
             <a:endParaRPr lang="en-US">
               <a:solidFill>
@@ -27962,7 +28401,7 @@
 </p:sld>
 </file>
 
-<file path=ppt/slides/slide32.xml><?xml version="1.0" encoding="utf-8"?>
+<file path=ppt/slides/slide33.xml><?xml version="1.0" encoding="utf-8"?>
 <p:sld xmlns:a="http://schemas.openxmlformats.org/drawingml/2006/main" xmlns:r="http://schemas.openxmlformats.org/officeDocument/2006/relationships" xmlns:p="http://schemas.openxmlformats.org/presentationml/2006/main">
   <p:cSld>
     <p:spTree>
@@ -28164,7 +28603,7 @@
               <a:pPr>
                 <a:defRPr/>
               </a:pPr>
-              <a:t>32</a:t>
+              <a:t>33</a:t>
             </a:fld>
             <a:endParaRPr lang="en-US">
               <a:solidFill>
@@ -29376,7 +29815,7 @@
                 <a:buFontTx/>
                 <a:buNone/>
               </a:pPr>
-              <a:t>10/12/2022</a:t>
+              <a:t>10/14/2022</a:t>
             </a:fld>
             <a:endParaRPr lang="en-US" altLang="zh-CN" sz="1000">
               <a:ea typeface="宋体" panose="02010600030101010101" pitchFamily="2" charset="-122"/>
@@ -30189,7 +30628,7 @@
           <a:graphicData uri="http://schemas.openxmlformats.org/presentationml/2006/ole">
             <mc:AlternateContent xmlns:mc="http://schemas.openxmlformats.org/markup-compatibility/2006">
               <mc:Choice xmlns:v="urn:schemas-microsoft-com:vml" Requires="v">
-                <p:oleObj spid="_x0000_s1027" name="包装程序外壳对象" showAsIcon="1" r:id="rId9" imgW="2094840" imgH="552600" progId="Package">
+                <p:oleObj spid="_x0000_s1036" name="包装程序外壳对象" showAsIcon="1" r:id="rId9" imgW="2094840" imgH="552600" progId="Package">
                   <p:embed/>
                 </p:oleObj>
               </mc:Choice>
@@ -30541,7 +30980,7 @@
                 <a:buFontTx/>
                 <a:buNone/>
               </a:pPr>
-              <a:t>10/12/2022</a:t>
+              <a:t>10/14/2022</a:t>
             </a:fld>
             <a:endParaRPr lang="en-US" altLang="zh-CN" sz="1000">
               <a:ea typeface="宋体" panose="02010600030101010101" pitchFamily="2" charset="-122"/>
@@ -31362,7 +31801,7 @@
           <a:graphicData uri="http://schemas.openxmlformats.org/presentationml/2006/ole">
             <mc:AlternateContent xmlns:mc="http://schemas.openxmlformats.org/markup-compatibility/2006">
               <mc:Choice xmlns:v="urn:schemas-microsoft-com:vml" Requires="v">
-                <p:oleObj spid="_x0000_s2051" name="包装程序外壳对象" showAsIcon="1" r:id="rId8" imgW="2094840" imgH="552600" progId="Package">
+                <p:oleObj spid="_x0000_s2060" name="包装程序外壳对象" showAsIcon="1" r:id="rId8" imgW="2094840" imgH="552600" progId="Package">
                   <p:embed/>
                 </p:oleObj>
               </mc:Choice>

</xml_diff>